<commit_message>
Completed slides, for now.
</commit_message>
<xml_diff>
--- a/slides.pptx
+++ b/slides.pptx
@@ -10,6 +10,15 @@
     <p:sldId id="258" r:id="rId4"/>
     <p:sldId id="259" r:id="rId5"/>
     <p:sldId id="260" r:id="rId6"/>
+    <p:sldId id="261" r:id="rId7"/>
+    <p:sldId id="262" r:id="rId8"/>
+    <p:sldId id="263" r:id="rId9"/>
+    <p:sldId id="264" r:id="rId10"/>
+    <p:sldId id="265" r:id="rId11"/>
+    <p:sldId id="266" r:id="rId12"/>
+    <p:sldId id="267" r:id="rId13"/>
+    <p:sldId id="268" r:id="rId14"/>
+    <p:sldId id="269" r:id="rId15"/>
   </p:sldIdLst>
   <p:sldSz cx="12192000" cy="6858000"/>
   <p:notesSz cx="6858000" cy="9144000"/>
@@ -286,7 +295,7 @@
             <a:fld id="{87DE6118-2437-4B30-8E3C-4D2BE6020583}" type="datetimeFigureOut">
               <a:rPr lang="en-US" dirty="0"/>
               <a:pPr/>
-              <a:t>11/18/18</a:t>
+              <a:t>11/22/18</a:t>
             </a:fld>
             <a:endParaRPr lang="en-US" dirty="0"/>
           </a:p>
@@ -612,7 +621,7 @@
           <a:p>
             <a:fld id="{87DE6118-2437-4B30-8E3C-4D2BE6020583}" type="datetimeFigureOut">
               <a:rPr lang="en-US" dirty="0"/>
-              <a:t>11/18/18</a:t>
+              <a:t>11/22/18</a:t>
             </a:fld>
             <a:endParaRPr lang="en-US" dirty="0"/>
           </a:p>
@@ -787,7 +796,7 @@
           <a:p>
             <a:fld id="{87DE6118-2437-4B30-8E3C-4D2BE6020583}" type="datetimeFigureOut">
               <a:rPr lang="en-US" dirty="0"/>
-              <a:t>11/18/18</a:t>
+              <a:t>11/22/18</a:t>
             </a:fld>
             <a:endParaRPr lang="en-US" dirty="0"/>
           </a:p>
@@ -952,7 +961,7 @@
           <a:p>
             <a:fld id="{87DE6118-2437-4B30-8E3C-4D2BE6020583}" type="datetimeFigureOut">
               <a:rPr lang="en-US" dirty="0"/>
-              <a:t>11/18/18</a:t>
+              <a:t>11/22/18</a:t>
             </a:fld>
             <a:endParaRPr lang="en-US" dirty="0"/>
           </a:p>
@@ -1225,7 +1234,7 @@
             <a:fld id="{87DE6118-2437-4B30-8E3C-4D2BE6020583}" type="datetimeFigureOut">
               <a:rPr lang="en-US" dirty="0"/>
               <a:pPr/>
-              <a:t>11/18/18</a:t>
+              <a:t>11/22/18</a:t>
             </a:fld>
             <a:endParaRPr lang="en-US" dirty="0"/>
           </a:p>
@@ -1615,7 +1624,7 @@
           <a:p>
             <a:fld id="{87DE6118-2437-4B30-8E3C-4D2BE6020583}" type="datetimeFigureOut">
               <a:rPr lang="en-US" dirty="0"/>
-              <a:t>11/18/18</a:t>
+              <a:t>11/22/18</a:t>
             </a:fld>
             <a:endParaRPr lang="en-US" dirty="0"/>
           </a:p>
@@ -2087,7 +2096,7 @@
           <a:p>
             <a:fld id="{87DE6118-2437-4B30-8E3C-4D2BE6020583}" type="datetimeFigureOut">
               <a:rPr lang="en-US" dirty="0"/>
-              <a:t>11/18/18</a:t>
+              <a:t>11/22/18</a:t>
             </a:fld>
             <a:endParaRPr lang="en-US" dirty="0"/>
           </a:p>
@@ -2200,7 +2209,7 @@
           <a:p>
             <a:fld id="{87DE6118-2437-4B30-8E3C-4D2BE6020583}" type="datetimeFigureOut">
               <a:rPr lang="en-US" dirty="0"/>
-              <a:t>11/18/18</a:t>
+              <a:t>11/22/18</a:t>
             </a:fld>
             <a:endParaRPr lang="en-US" dirty="0"/>
           </a:p>
@@ -2290,7 +2299,7 @@
           <a:p>
             <a:fld id="{87DE6118-2437-4B30-8E3C-4D2BE6020583}" type="datetimeFigureOut">
               <a:rPr lang="en-US" dirty="0"/>
-              <a:t>11/18/18</a:t>
+              <a:t>11/22/18</a:t>
             </a:fld>
             <a:endParaRPr lang="en-US" dirty="0"/>
           </a:p>
@@ -2632,7 +2641,7 @@
             <a:fld id="{87DE6118-2437-4B30-8E3C-4D2BE6020583}" type="datetimeFigureOut">
               <a:rPr lang="en-US" dirty="0"/>
               <a:pPr/>
-              <a:t>11/18/18</a:t>
+              <a:t>11/22/18</a:t>
             </a:fld>
             <a:endParaRPr lang="en-US" dirty="0"/>
           </a:p>
@@ -3017,7 +3026,7 @@
             <a:fld id="{87DE6118-2437-4B30-8E3C-4D2BE6020583}" type="datetimeFigureOut">
               <a:rPr lang="en-US" dirty="0"/>
               <a:pPr/>
-              <a:t>11/18/18</a:t>
+              <a:t>11/22/18</a:t>
             </a:fld>
             <a:endParaRPr lang="en-US" dirty="0"/>
           </a:p>
@@ -3292,7 +3301,7 @@
             <a:fld id="{87DE6118-2437-4B30-8E3C-4D2BE6020583}" type="datetimeFigureOut">
               <a:rPr lang="en-US" dirty="0"/>
               <a:pPr/>
-              <a:t>11/18/18</a:t>
+              <a:t>11/22/18</a:t>
             </a:fld>
             <a:endParaRPr lang="en-US" dirty="0"/>
           </a:p>
@@ -3875,6 +3884,2164 @@
 </p:sld>
 </file>
 
+<file path=ppt/slides/slide10.xml><?xml version="1.0" encoding="utf-8"?>
+<p:sld xmlns:a="http://schemas.openxmlformats.org/drawingml/2006/main" xmlns:r="http://schemas.openxmlformats.org/officeDocument/2006/relationships" xmlns:p="http://schemas.openxmlformats.org/presentationml/2006/main">
+  <p:cSld>
+    <p:spTree>
+      <p:nvGrpSpPr>
+        <p:cNvPr id="1" name=""/>
+        <p:cNvGrpSpPr/>
+        <p:nvPr/>
+      </p:nvGrpSpPr>
+      <p:grpSpPr>
+        <a:xfrm>
+          <a:off x="0" y="0"/>
+          <a:ext cx="0" cy="0"/>
+          <a:chOff x="0" y="0"/>
+          <a:chExt cx="0" cy="0"/>
+        </a:xfrm>
+      </p:grpSpPr>
+      <p:sp>
+        <p:nvSpPr>
+          <p:cNvPr id="2" name="Title 1">
+            <a:extLst>
+              <a:ext uri="{FF2B5EF4-FFF2-40B4-BE49-F238E27FC236}">
+                <a16:creationId xmlns:a16="http://schemas.microsoft.com/office/drawing/2014/main" id="{C77B29EF-6758-B849-B4DF-F5C4200C10AA}"/>
+              </a:ext>
+            </a:extLst>
+          </p:cNvPr>
+          <p:cNvSpPr>
+            <a:spLocks noGrp="1"/>
+          </p:cNvSpPr>
+          <p:nvPr>
+            <p:ph type="title"/>
+          </p:nvPr>
+        </p:nvSpPr>
+        <p:spPr/>
+        <p:txBody>
+          <a:bodyPr/>
+          <a:lstStyle/>
+          <a:p>
+            <a:pPr algn="ctr"/>
+            <a:r>
+              <a:rPr lang="en-US" dirty="0" err="1"/>
+              <a:t>Asyncio</a:t>
+            </a:r>
+            <a:endParaRPr lang="en-US" dirty="0"/>
+          </a:p>
+        </p:txBody>
+      </p:sp>
+      <p:sp>
+        <p:nvSpPr>
+          <p:cNvPr id="3" name="Content Placeholder 2">
+            <a:extLst>
+              <a:ext uri="{FF2B5EF4-FFF2-40B4-BE49-F238E27FC236}">
+                <a16:creationId xmlns:a16="http://schemas.microsoft.com/office/drawing/2014/main" id="{F80EC36D-5149-094D-8323-AF74E7F21365}"/>
+              </a:ext>
+            </a:extLst>
+          </p:cNvPr>
+          <p:cNvSpPr>
+            <a:spLocks noGrp="1"/>
+          </p:cNvSpPr>
+          <p:nvPr>
+            <p:ph idx="1"/>
+          </p:nvPr>
+        </p:nvSpPr>
+        <p:spPr>
+          <a:xfrm>
+            <a:off x="1371600" y="1922079"/>
+            <a:ext cx="3210910" cy="499241"/>
+          </a:xfrm>
+        </p:spPr>
+        <p:txBody>
+          <a:bodyPr/>
+          <a:lstStyle/>
+          <a:p>
+            <a:r>
+              <a:rPr lang="en-US" dirty="0"/>
+              <a:t>3 building blocks:</a:t>
+            </a:r>
+          </a:p>
+        </p:txBody>
+      </p:sp>
+      <p:sp>
+        <p:nvSpPr>
+          <p:cNvPr id="4" name="Content Placeholder 2">
+            <a:extLst>
+              <a:ext uri="{FF2B5EF4-FFF2-40B4-BE49-F238E27FC236}">
+                <a16:creationId xmlns:a16="http://schemas.microsoft.com/office/drawing/2014/main" id="{AA879DE5-C36A-CD4D-B1D3-1D76331B4616}"/>
+              </a:ext>
+            </a:extLst>
+          </p:cNvPr>
+          <p:cNvSpPr txBox="1">
+            <a:spLocks/>
+          </p:cNvSpPr>
+          <p:nvPr/>
+        </p:nvSpPr>
+        <p:spPr>
+          <a:xfrm>
+            <a:off x="2149364" y="2750426"/>
+            <a:ext cx="9149256" cy="896007"/>
+          </a:xfrm>
+          <a:prstGeom prst="rect">
+            <a:avLst/>
+          </a:prstGeom>
+        </p:spPr>
+        <p:txBody>
+          <a:bodyPr vert="horz" lIns="91440" tIns="45720" rIns="91440" bIns="45720" rtlCol="0">
+            <a:normAutofit fontScale="92500"/>
+          </a:bodyPr>
+          <a:lstStyle>
+            <a:lvl1pPr marL="384048" indent="-384048" algn="l" defTabSz="914400" rtl="0" eaLnBrk="1" latinLnBrk="0" hangingPunct="1">
+              <a:lnSpc>
+                <a:spcPct val="94000"/>
+              </a:lnSpc>
+              <a:spcBef>
+                <a:spcPts val="1000"/>
+              </a:spcBef>
+              <a:spcAft>
+                <a:spcPts val="200"/>
+              </a:spcAft>
+              <a:buFont typeface="Franklin Gothic Book" panose="020B0503020102020204" pitchFamily="34" charset="0"/>
+              <a:buChar char="■"/>
+              <a:defRPr sz="2000" kern="1200" baseline="0">
+                <a:solidFill>
+                  <a:schemeClr val="tx2"/>
+                </a:solidFill>
+                <a:latin typeface="+mn-lt"/>
+                <a:ea typeface="+mn-ea"/>
+                <a:cs typeface="+mn-cs"/>
+              </a:defRPr>
+            </a:lvl1pPr>
+            <a:lvl2pPr marL="914400" indent="-384048" algn="l" defTabSz="914400" rtl="0" eaLnBrk="1" latinLnBrk="0" hangingPunct="1">
+              <a:lnSpc>
+                <a:spcPct val="94000"/>
+              </a:lnSpc>
+              <a:spcBef>
+                <a:spcPts val="500"/>
+              </a:spcBef>
+              <a:spcAft>
+                <a:spcPts val="200"/>
+              </a:spcAft>
+              <a:buFont typeface="Franklin Gothic Book" panose="020B0503020102020204" pitchFamily="34" charset="0"/>
+              <a:buChar char="–"/>
+              <a:defRPr sz="2000" i="1" kern="1200" baseline="0">
+                <a:solidFill>
+                  <a:schemeClr val="tx2"/>
+                </a:solidFill>
+                <a:latin typeface="+mn-lt"/>
+                <a:ea typeface="+mn-ea"/>
+                <a:cs typeface="+mn-cs"/>
+              </a:defRPr>
+            </a:lvl2pPr>
+            <a:lvl3pPr marL="1371600" indent="-384048" algn="l" defTabSz="914400" rtl="0" eaLnBrk="1" latinLnBrk="0" hangingPunct="1">
+              <a:lnSpc>
+                <a:spcPct val="94000"/>
+              </a:lnSpc>
+              <a:spcBef>
+                <a:spcPts val="500"/>
+              </a:spcBef>
+              <a:spcAft>
+                <a:spcPts val="200"/>
+              </a:spcAft>
+              <a:buFont typeface="Franklin Gothic Book" panose="020B0503020102020204" pitchFamily="34" charset="0"/>
+              <a:buChar char="■"/>
+              <a:defRPr sz="1800" kern="1200" baseline="0">
+                <a:solidFill>
+                  <a:schemeClr val="tx2"/>
+                </a:solidFill>
+                <a:latin typeface="+mn-lt"/>
+                <a:ea typeface="+mn-ea"/>
+                <a:cs typeface="+mn-cs"/>
+              </a:defRPr>
+            </a:lvl3pPr>
+            <a:lvl4pPr marL="1828800" indent="-384048" algn="l" defTabSz="914400" rtl="0" eaLnBrk="1" latinLnBrk="0" hangingPunct="1">
+              <a:lnSpc>
+                <a:spcPct val="94000"/>
+              </a:lnSpc>
+              <a:spcBef>
+                <a:spcPts val="500"/>
+              </a:spcBef>
+              <a:spcAft>
+                <a:spcPts val="200"/>
+              </a:spcAft>
+              <a:buFont typeface="Franklin Gothic Book" panose="020B0503020102020204" pitchFamily="34" charset="0"/>
+              <a:buChar char="–"/>
+              <a:defRPr sz="1800" i="1" kern="1200" baseline="0">
+                <a:solidFill>
+                  <a:schemeClr val="tx2"/>
+                </a:solidFill>
+                <a:latin typeface="+mn-lt"/>
+                <a:ea typeface="+mn-ea"/>
+                <a:cs typeface="+mn-cs"/>
+              </a:defRPr>
+            </a:lvl4pPr>
+            <a:lvl5pPr marL="2286000" indent="-384048" algn="l" defTabSz="914400" rtl="0" eaLnBrk="1" latinLnBrk="0" hangingPunct="1">
+              <a:lnSpc>
+                <a:spcPct val="94000"/>
+              </a:lnSpc>
+              <a:spcBef>
+                <a:spcPts val="500"/>
+              </a:spcBef>
+              <a:spcAft>
+                <a:spcPts val="200"/>
+              </a:spcAft>
+              <a:buFont typeface="Franklin Gothic Book" panose="020B0503020102020204" pitchFamily="34" charset="0"/>
+              <a:buChar char="■"/>
+              <a:defRPr sz="1600" kern="1200" baseline="0">
+                <a:solidFill>
+                  <a:schemeClr val="tx2"/>
+                </a:solidFill>
+                <a:latin typeface="+mn-lt"/>
+                <a:ea typeface="+mn-ea"/>
+                <a:cs typeface="+mn-cs"/>
+              </a:defRPr>
+            </a:lvl5pPr>
+            <a:lvl6pPr marL="2743200" indent="-384048" algn="l" defTabSz="914400" rtl="0" eaLnBrk="1" latinLnBrk="0" hangingPunct="1">
+              <a:lnSpc>
+                <a:spcPct val="94000"/>
+              </a:lnSpc>
+              <a:spcBef>
+                <a:spcPts val="500"/>
+              </a:spcBef>
+              <a:spcAft>
+                <a:spcPts val="200"/>
+              </a:spcAft>
+              <a:buFont typeface="Franklin Gothic Book" panose="020B0503020102020204" pitchFamily="34" charset="0"/>
+              <a:buChar char="–"/>
+              <a:defRPr sz="1600" i="1" kern="1200" baseline="0">
+                <a:solidFill>
+                  <a:schemeClr val="tx2"/>
+                </a:solidFill>
+                <a:latin typeface="+mn-lt"/>
+                <a:ea typeface="+mn-ea"/>
+                <a:cs typeface="+mn-cs"/>
+              </a:defRPr>
+            </a:lvl6pPr>
+            <a:lvl7pPr marL="3200400" indent="-384048" algn="l" defTabSz="914400" rtl="0" eaLnBrk="1" latinLnBrk="0" hangingPunct="1">
+              <a:lnSpc>
+                <a:spcPct val="94000"/>
+              </a:lnSpc>
+              <a:spcBef>
+                <a:spcPts val="500"/>
+              </a:spcBef>
+              <a:spcAft>
+                <a:spcPts val="200"/>
+              </a:spcAft>
+              <a:buFont typeface="Franklin Gothic Book" panose="020B0503020102020204" pitchFamily="34" charset="0"/>
+              <a:buChar char="■"/>
+              <a:defRPr sz="1400" kern="1200" baseline="0">
+                <a:solidFill>
+                  <a:schemeClr val="tx2"/>
+                </a:solidFill>
+                <a:latin typeface="+mn-lt"/>
+                <a:ea typeface="+mn-ea"/>
+                <a:cs typeface="+mn-cs"/>
+              </a:defRPr>
+            </a:lvl7pPr>
+            <a:lvl8pPr marL="3657600" indent="-384048" algn="l" defTabSz="914400" rtl="0" eaLnBrk="1" latinLnBrk="0" hangingPunct="1">
+              <a:lnSpc>
+                <a:spcPct val="94000"/>
+              </a:lnSpc>
+              <a:spcBef>
+                <a:spcPts val="500"/>
+              </a:spcBef>
+              <a:spcAft>
+                <a:spcPts val="200"/>
+              </a:spcAft>
+              <a:buFont typeface="Franklin Gothic Book" panose="020B0503020102020204" pitchFamily="34" charset="0"/>
+              <a:buChar char="–"/>
+              <a:defRPr sz="1400" i="1" kern="1200" baseline="0">
+                <a:solidFill>
+                  <a:schemeClr val="tx2"/>
+                </a:solidFill>
+                <a:latin typeface="+mn-lt"/>
+                <a:ea typeface="+mn-ea"/>
+                <a:cs typeface="+mn-cs"/>
+              </a:defRPr>
+            </a:lvl8pPr>
+            <a:lvl9pPr marL="4114800" indent="-384048" algn="l" defTabSz="914400" rtl="0" eaLnBrk="1" latinLnBrk="0" hangingPunct="1">
+              <a:lnSpc>
+                <a:spcPct val="94000"/>
+              </a:lnSpc>
+              <a:spcBef>
+                <a:spcPts val="500"/>
+              </a:spcBef>
+              <a:spcAft>
+                <a:spcPts val="200"/>
+              </a:spcAft>
+              <a:buFont typeface="Franklin Gothic Book" panose="020B0503020102020204" pitchFamily="34" charset="0"/>
+              <a:buChar char="■"/>
+              <a:defRPr sz="1400" kern="1200" baseline="0">
+                <a:solidFill>
+                  <a:schemeClr val="tx2"/>
+                </a:solidFill>
+                <a:latin typeface="+mn-lt"/>
+                <a:ea typeface="+mn-ea"/>
+                <a:cs typeface="+mn-cs"/>
+              </a:defRPr>
+            </a:lvl9pPr>
+          </a:lstStyle>
+          <a:p>
+            <a:r>
+              <a:rPr lang="en-US" dirty="0"/>
+              <a:t>Event loop</a:t>
+            </a:r>
+          </a:p>
+          <a:p>
+            <a:pPr lvl="1"/>
+            <a:r>
+              <a:rPr lang="en-US" dirty="0"/>
+              <a:t>Used to pause tasks that are waiting on IO and switch to those that are ready</a:t>
+            </a:r>
+          </a:p>
+        </p:txBody>
+      </p:sp>
+      <p:sp>
+        <p:nvSpPr>
+          <p:cNvPr id="5" name="Content Placeholder 2">
+            <a:extLst>
+              <a:ext uri="{FF2B5EF4-FFF2-40B4-BE49-F238E27FC236}">
+                <a16:creationId xmlns:a16="http://schemas.microsoft.com/office/drawing/2014/main" id="{504C667B-6241-BE46-9BF5-5D4260AFF70A}"/>
+              </a:ext>
+            </a:extLst>
+          </p:cNvPr>
+          <p:cNvSpPr txBox="1">
+            <a:spLocks/>
+          </p:cNvSpPr>
+          <p:nvPr/>
+        </p:nvSpPr>
+        <p:spPr>
+          <a:xfrm>
+            <a:off x="2149364" y="3852699"/>
+            <a:ext cx="9149256" cy="1354521"/>
+          </a:xfrm>
+          <a:prstGeom prst="rect">
+            <a:avLst/>
+          </a:prstGeom>
+        </p:spPr>
+        <p:txBody>
+          <a:bodyPr vert="horz" lIns="91440" tIns="45720" rIns="91440" bIns="45720" rtlCol="0">
+            <a:normAutofit/>
+          </a:bodyPr>
+          <a:lstStyle>
+            <a:lvl1pPr marL="384048" indent="-384048" algn="l" defTabSz="914400" rtl="0" eaLnBrk="1" latinLnBrk="0" hangingPunct="1">
+              <a:lnSpc>
+                <a:spcPct val="94000"/>
+              </a:lnSpc>
+              <a:spcBef>
+                <a:spcPts val="1000"/>
+              </a:spcBef>
+              <a:spcAft>
+                <a:spcPts val="200"/>
+              </a:spcAft>
+              <a:buFont typeface="Franklin Gothic Book" panose="020B0503020102020204" pitchFamily="34" charset="0"/>
+              <a:buChar char="■"/>
+              <a:defRPr sz="2000" kern="1200" baseline="0">
+                <a:solidFill>
+                  <a:schemeClr val="tx2"/>
+                </a:solidFill>
+                <a:latin typeface="+mn-lt"/>
+                <a:ea typeface="+mn-ea"/>
+                <a:cs typeface="+mn-cs"/>
+              </a:defRPr>
+            </a:lvl1pPr>
+            <a:lvl2pPr marL="914400" indent="-384048" algn="l" defTabSz="914400" rtl="0" eaLnBrk="1" latinLnBrk="0" hangingPunct="1">
+              <a:lnSpc>
+                <a:spcPct val="94000"/>
+              </a:lnSpc>
+              <a:spcBef>
+                <a:spcPts val="500"/>
+              </a:spcBef>
+              <a:spcAft>
+                <a:spcPts val="200"/>
+              </a:spcAft>
+              <a:buFont typeface="Franklin Gothic Book" panose="020B0503020102020204" pitchFamily="34" charset="0"/>
+              <a:buChar char="–"/>
+              <a:defRPr sz="2000" i="1" kern="1200" baseline="0">
+                <a:solidFill>
+                  <a:schemeClr val="tx2"/>
+                </a:solidFill>
+                <a:latin typeface="+mn-lt"/>
+                <a:ea typeface="+mn-ea"/>
+                <a:cs typeface="+mn-cs"/>
+              </a:defRPr>
+            </a:lvl2pPr>
+            <a:lvl3pPr marL="1371600" indent="-384048" algn="l" defTabSz="914400" rtl="0" eaLnBrk="1" latinLnBrk="0" hangingPunct="1">
+              <a:lnSpc>
+                <a:spcPct val="94000"/>
+              </a:lnSpc>
+              <a:spcBef>
+                <a:spcPts val="500"/>
+              </a:spcBef>
+              <a:spcAft>
+                <a:spcPts val="200"/>
+              </a:spcAft>
+              <a:buFont typeface="Franklin Gothic Book" panose="020B0503020102020204" pitchFamily="34" charset="0"/>
+              <a:buChar char="■"/>
+              <a:defRPr sz="1800" kern="1200" baseline="0">
+                <a:solidFill>
+                  <a:schemeClr val="tx2"/>
+                </a:solidFill>
+                <a:latin typeface="+mn-lt"/>
+                <a:ea typeface="+mn-ea"/>
+                <a:cs typeface="+mn-cs"/>
+              </a:defRPr>
+            </a:lvl3pPr>
+            <a:lvl4pPr marL="1828800" indent="-384048" algn="l" defTabSz="914400" rtl="0" eaLnBrk="1" latinLnBrk="0" hangingPunct="1">
+              <a:lnSpc>
+                <a:spcPct val="94000"/>
+              </a:lnSpc>
+              <a:spcBef>
+                <a:spcPts val="500"/>
+              </a:spcBef>
+              <a:spcAft>
+                <a:spcPts val="200"/>
+              </a:spcAft>
+              <a:buFont typeface="Franklin Gothic Book" panose="020B0503020102020204" pitchFamily="34" charset="0"/>
+              <a:buChar char="–"/>
+              <a:defRPr sz="1800" i="1" kern="1200" baseline="0">
+                <a:solidFill>
+                  <a:schemeClr val="tx2"/>
+                </a:solidFill>
+                <a:latin typeface="+mn-lt"/>
+                <a:ea typeface="+mn-ea"/>
+                <a:cs typeface="+mn-cs"/>
+              </a:defRPr>
+            </a:lvl4pPr>
+            <a:lvl5pPr marL="2286000" indent="-384048" algn="l" defTabSz="914400" rtl="0" eaLnBrk="1" latinLnBrk="0" hangingPunct="1">
+              <a:lnSpc>
+                <a:spcPct val="94000"/>
+              </a:lnSpc>
+              <a:spcBef>
+                <a:spcPts val="500"/>
+              </a:spcBef>
+              <a:spcAft>
+                <a:spcPts val="200"/>
+              </a:spcAft>
+              <a:buFont typeface="Franklin Gothic Book" panose="020B0503020102020204" pitchFamily="34" charset="0"/>
+              <a:buChar char="■"/>
+              <a:defRPr sz="1600" kern="1200" baseline="0">
+                <a:solidFill>
+                  <a:schemeClr val="tx2"/>
+                </a:solidFill>
+                <a:latin typeface="+mn-lt"/>
+                <a:ea typeface="+mn-ea"/>
+                <a:cs typeface="+mn-cs"/>
+              </a:defRPr>
+            </a:lvl5pPr>
+            <a:lvl6pPr marL="2743200" indent="-384048" algn="l" defTabSz="914400" rtl="0" eaLnBrk="1" latinLnBrk="0" hangingPunct="1">
+              <a:lnSpc>
+                <a:spcPct val="94000"/>
+              </a:lnSpc>
+              <a:spcBef>
+                <a:spcPts val="500"/>
+              </a:spcBef>
+              <a:spcAft>
+                <a:spcPts val="200"/>
+              </a:spcAft>
+              <a:buFont typeface="Franklin Gothic Book" panose="020B0503020102020204" pitchFamily="34" charset="0"/>
+              <a:buChar char="–"/>
+              <a:defRPr sz="1600" i="1" kern="1200" baseline="0">
+                <a:solidFill>
+                  <a:schemeClr val="tx2"/>
+                </a:solidFill>
+                <a:latin typeface="+mn-lt"/>
+                <a:ea typeface="+mn-ea"/>
+                <a:cs typeface="+mn-cs"/>
+              </a:defRPr>
+            </a:lvl6pPr>
+            <a:lvl7pPr marL="3200400" indent="-384048" algn="l" defTabSz="914400" rtl="0" eaLnBrk="1" latinLnBrk="0" hangingPunct="1">
+              <a:lnSpc>
+                <a:spcPct val="94000"/>
+              </a:lnSpc>
+              <a:spcBef>
+                <a:spcPts val="500"/>
+              </a:spcBef>
+              <a:spcAft>
+                <a:spcPts val="200"/>
+              </a:spcAft>
+              <a:buFont typeface="Franklin Gothic Book" panose="020B0503020102020204" pitchFamily="34" charset="0"/>
+              <a:buChar char="■"/>
+              <a:defRPr sz="1400" kern="1200" baseline="0">
+                <a:solidFill>
+                  <a:schemeClr val="tx2"/>
+                </a:solidFill>
+                <a:latin typeface="+mn-lt"/>
+                <a:ea typeface="+mn-ea"/>
+                <a:cs typeface="+mn-cs"/>
+              </a:defRPr>
+            </a:lvl7pPr>
+            <a:lvl8pPr marL="3657600" indent="-384048" algn="l" defTabSz="914400" rtl="0" eaLnBrk="1" latinLnBrk="0" hangingPunct="1">
+              <a:lnSpc>
+                <a:spcPct val="94000"/>
+              </a:lnSpc>
+              <a:spcBef>
+                <a:spcPts val="500"/>
+              </a:spcBef>
+              <a:spcAft>
+                <a:spcPts val="200"/>
+              </a:spcAft>
+              <a:buFont typeface="Franklin Gothic Book" panose="020B0503020102020204" pitchFamily="34" charset="0"/>
+              <a:buChar char="–"/>
+              <a:defRPr sz="1400" i="1" kern="1200" baseline="0">
+                <a:solidFill>
+                  <a:schemeClr val="tx2"/>
+                </a:solidFill>
+                <a:latin typeface="+mn-lt"/>
+                <a:ea typeface="+mn-ea"/>
+                <a:cs typeface="+mn-cs"/>
+              </a:defRPr>
+            </a:lvl8pPr>
+            <a:lvl9pPr marL="4114800" indent="-384048" algn="l" defTabSz="914400" rtl="0" eaLnBrk="1" latinLnBrk="0" hangingPunct="1">
+              <a:lnSpc>
+                <a:spcPct val="94000"/>
+              </a:lnSpc>
+              <a:spcBef>
+                <a:spcPts val="500"/>
+              </a:spcBef>
+              <a:spcAft>
+                <a:spcPts val="200"/>
+              </a:spcAft>
+              <a:buFont typeface="Franklin Gothic Book" panose="020B0503020102020204" pitchFamily="34" charset="0"/>
+              <a:buChar char="■"/>
+              <a:defRPr sz="1400" kern="1200" baseline="0">
+                <a:solidFill>
+                  <a:schemeClr val="tx2"/>
+                </a:solidFill>
+                <a:latin typeface="+mn-lt"/>
+                <a:ea typeface="+mn-ea"/>
+                <a:cs typeface="+mn-cs"/>
+              </a:defRPr>
+            </a:lvl9pPr>
+          </a:lstStyle>
+          <a:p>
+            <a:r>
+              <a:rPr lang="en-US" dirty="0"/>
+              <a:t>Coroutines</a:t>
+            </a:r>
+          </a:p>
+          <a:p>
+            <a:pPr lvl="1"/>
+            <a:r>
+              <a:rPr lang="en-US" dirty="0"/>
+              <a:t>Behave like generators</a:t>
+            </a:r>
+          </a:p>
+          <a:p>
+            <a:pPr lvl="1"/>
+            <a:r>
+              <a:rPr lang="en-US" dirty="0"/>
+              <a:t>Yield control back to the caller and retain their state</a:t>
+            </a:r>
+          </a:p>
+        </p:txBody>
+      </p:sp>
+      <p:sp>
+        <p:nvSpPr>
+          <p:cNvPr id="6" name="Content Placeholder 2">
+            <a:extLst>
+              <a:ext uri="{FF2B5EF4-FFF2-40B4-BE49-F238E27FC236}">
+                <a16:creationId xmlns:a16="http://schemas.microsoft.com/office/drawing/2014/main" id="{039CE01B-3D19-7543-9151-24EEA8B71551}"/>
+              </a:ext>
+            </a:extLst>
+          </p:cNvPr>
+          <p:cNvSpPr txBox="1">
+            <a:spLocks/>
+          </p:cNvSpPr>
+          <p:nvPr/>
+        </p:nvSpPr>
+        <p:spPr>
+          <a:xfrm>
+            <a:off x="2149364" y="5334331"/>
+            <a:ext cx="9149256" cy="1044465"/>
+          </a:xfrm>
+          <a:prstGeom prst="rect">
+            <a:avLst/>
+          </a:prstGeom>
+        </p:spPr>
+        <p:txBody>
+          <a:bodyPr vert="horz" lIns="91440" tIns="45720" rIns="91440" bIns="45720" rtlCol="0">
+            <a:normAutofit fontScale="92500" lnSpcReduction="10000"/>
+          </a:bodyPr>
+          <a:lstStyle>
+            <a:lvl1pPr marL="384048" indent="-384048" algn="l" defTabSz="914400" rtl="0" eaLnBrk="1" latinLnBrk="0" hangingPunct="1">
+              <a:lnSpc>
+                <a:spcPct val="94000"/>
+              </a:lnSpc>
+              <a:spcBef>
+                <a:spcPts val="1000"/>
+              </a:spcBef>
+              <a:spcAft>
+                <a:spcPts val="200"/>
+              </a:spcAft>
+              <a:buFont typeface="Franklin Gothic Book" panose="020B0503020102020204" pitchFamily="34" charset="0"/>
+              <a:buChar char="■"/>
+              <a:defRPr sz="2000" kern="1200" baseline="0">
+                <a:solidFill>
+                  <a:schemeClr val="tx2"/>
+                </a:solidFill>
+                <a:latin typeface="+mn-lt"/>
+                <a:ea typeface="+mn-ea"/>
+                <a:cs typeface="+mn-cs"/>
+              </a:defRPr>
+            </a:lvl1pPr>
+            <a:lvl2pPr marL="914400" indent="-384048" algn="l" defTabSz="914400" rtl="0" eaLnBrk="1" latinLnBrk="0" hangingPunct="1">
+              <a:lnSpc>
+                <a:spcPct val="94000"/>
+              </a:lnSpc>
+              <a:spcBef>
+                <a:spcPts val="500"/>
+              </a:spcBef>
+              <a:spcAft>
+                <a:spcPts val="200"/>
+              </a:spcAft>
+              <a:buFont typeface="Franklin Gothic Book" panose="020B0503020102020204" pitchFamily="34" charset="0"/>
+              <a:buChar char="–"/>
+              <a:defRPr sz="2000" i="1" kern="1200" baseline="0">
+                <a:solidFill>
+                  <a:schemeClr val="tx2"/>
+                </a:solidFill>
+                <a:latin typeface="+mn-lt"/>
+                <a:ea typeface="+mn-ea"/>
+                <a:cs typeface="+mn-cs"/>
+              </a:defRPr>
+            </a:lvl2pPr>
+            <a:lvl3pPr marL="1371600" indent="-384048" algn="l" defTabSz="914400" rtl="0" eaLnBrk="1" latinLnBrk="0" hangingPunct="1">
+              <a:lnSpc>
+                <a:spcPct val="94000"/>
+              </a:lnSpc>
+              <a:spcBef>
+                <a:spcPts val="500"/>
+              </a:spcBef>
+              <a:spcAft>
+                <a:spcPts val="200"/>
+              </a:spcAft>
+              <a:buFont typeface="Franklin Gothic Book" panose="020B0503020102020204" pitchFamily="34" charset="0"/>
+              <a:buChar char="■"/>
+              <a:defRPr sz="1800" kern="1200" baseline="0">
+                <a:solidFill>
+                  <a:schemeClr val="tx2"/>
+                </a:solidFill>
+                <a:latin typeface="+mn-lt"/>
+                <a:ea typeface="+mn-ea"/>
+                <a:cs typeface="+mn-cs"/>
+              </a:defRPr>
+            </a:lvl3pPr>
+            <a:lvl4pPr marL="1828800" indent="-384048" algn="l" defTabSz="914400" rtl="0" eaLnBrk="1" latinLnBrk="0" hangingPunct="1">
+              <a:lnSpc>
+                <a:spcPct val="94000"/>
+              </a:lnSpc>
+              <a:spcBef>
+                <a:spcPts val="500"/>
+              </a:spcBef>
+              <a:spcAft>
+                <a:spcPts val="200"/>
+              </a:spcAft>
+              <a:buFont typeface="Franklin Gothic Book" panose="020B0503020102020204" pitchFamily="34" charset="0"/>
+              <a:buChar char="–"/>
+              <a:defRPr sz="1800" i="1" kern="1200" baseline="0">
+                <a:solidFill>
+                  <a:schemeClr val="tx2"/>
+                </a:solidFill>
+                <a:latin typeface="+mn-lt"/>
+                <a:ea typeface="+mn-ea"/>
+                <a:cs typeface="+mn-cs"/>
+              </a:defRPr>
+            </a:lvl4pPr>
+            <a:lvl5pPr marL="2286000" indent="-384048" algn="l" defTabSz="914400" rtl="0" eaLnBrk="1" latinLnBrk="0" hangingPunct="1">
+              <a:lnSpc>
+                <a:spcPct val="94000"/>
+              </a:lnSpc>
+              <a:spcBef>
+                <a:spcPts val="500"/>
+              </a:spcBef>
+              <a:spcAft>
+                <a:spcPts val="200"/>
+              </a:spcAft>
+              <a:buFont typeface="Franklin Gothic Book" panose="020B0503020102020204" pitchFamily="34" charset="0"/>
+              <a:buChar char="■"/>
+              <a:defRPr sz="1600" kern="1200" baseline="0">
+                <a:solidFill>
+                  <a:schemeClr val="tx2"/>
+                </a:solidFill>
+                <a:latin typeface="+mn-lt"/>
+                <a:ea typeface="+mn-ea"/>
+                <a:cs typeface="+mn-cs"/>
+              </a:defRPr>
+            </a:lvl5pPr>
+            <a:lvl6pPr marL="2743200" indent="-384048" algn="l" defTabSz="914400" rtl="0" eaLnBrk="1" latinLnBrk="0" hangingPunct="1">
+              <a:lnSpc>
+                <a:spcPct val="94000"/>
+              </a:lnSpc>
+              <a:spcBef>
+                <a:spcPts val="500"/>
+              </a:spcBef>
+              <a:spcAft>
+                <a:spcPts val="200"/>
+              </a:spcAft>
+              <a:buFont typeface="Franklin Gothic Book" panose="020B0503020102020204" pitchFamily="34" charset="0"/>
+              <a:buChar char="–"/>
+              <a:defRPr sz="1600" i="1" kern="1200" baseline="0">
+                <a:solidFill>
+                  <a:schemeClr val="tx2"/>
+                </a:solidFill>
+                <a:latin typeface="+mn-lt"/>
+                <a:ea typeface="+mn-ea"/>
+                <a:cs typeface="+mn-cs"/>
+              </a:defRPr>
+            </a:lvl6pPr>
+            <a:lvl7pPr marL="3200400" indent="-384048" algn="l" defTabSz="914400" rtl="0" eaLnBrk="1" latinLnBrk="0" hangingPunct="1">
+              <a:lnSpc>
+                <a:spcPct val="94000"/>
+              </a:lnSpc>
+              <a:spcBef>
+                <a:spcPts val="500"/>
+              </a:spcBef>
+              <a:spcAft>
+                <a:spcPts val="200"/>
+              </a:spcAft>
+              <a:buFont typeface="Franklin Gothic Book" panose="020B0503020102020204" pitchFamily="34" charset="0"/>
+              <a:buChar char="■"/>
+              <a:defRPr sz="1400" kern="1200" baseline="0">
+                <a:solidFill>
+                  <a:schemeClr val="tx2"/>
+                </a:solidFill>
+                <a:latin typeface="+mn-lt"/>
+                <a:ea typeface="+mn-ea"/>
+                <a:cs typeface="+mn-cs"/>
+              </a:defRPr>
+            </a:lvl7pPr>
+            <a:lvl8pPr marL="3657600" indent="-384048" algn="l" defTabSz="914400" rtl="0" eaLnBrk="1" latinLnBrk="0" hangingPunct="1">
+              <a:lnSpc>
+                <a:spcPct val="94000"/>
+              </a:lnSpc>
+              <a:spcBef>
+                <a:spcPts val="500"/>
+              </a:spcBef>
+              <a:spcAft>
+                <a:spcPts val="200"/>
+              </a:spcAft>
+              <a:buFont typeface="Franklin Gothic Book" panose="020B0503020102020204" pitchFamily="34" charset="0"/>
+              <a:buChar char="–"/>
+              <a:defRPr sz="1400" i="1" kern="1200" baseline="0">
+                <a:solidFill>
+                  <a:schemeClr val="tx2"/>
+                </a:solidFill>
+                <a:latin typeface="+mn-lt"/>
+                <a:ea typeface="+mn-ea"/>
+                <a:cs typeface="+mn-cs"/>
+              </a:defRPr>
+            </a:lvl8pPr>
+            <a:lvl9pPr marL="4114800" indent="-384048" algn="l" defTabSz="914400" rtl="0" eaLnBrk="1" latinLnBrk="0" hangingPunct="1">
+              <a:lnSpc>
+                <a:spcPct val="94000"/>
+              </a:lnSpc>
+              <a:spcBef>
+                <a:spcPts val="500"/>
+              </a:spcBef>
+              <a:spcAft>
+                <a:spcPts val="200"/>
+              </a:spcAft>
+              <a:buFont typeface="Franklin Gothic Book" panose="020B0503020102020204" pitchFamily="34" charset="0"/>
+              <a:buChar char="■"/>
+              <a:defRPr sz="1400" kern="1200" baseline="0">
+                <a:solidFill>
+                  <a:schemeClr val="tx2"/>
+                </a:solidFill>
+                <a:latin typeface="+mn-lt"/>
+                <a:ea typeface="+mn-ea"/>
+                <a:cs typeface="+mn-cs"/>
+              </a:defRPr>
+            </a:lvl9pPr>
+          </a:lstStyle>
+          <a:p>
+            <a:r>
+              <a:rPr lang="en-US" dirty="0"/>
+              <a:t>Tasks</a:t>
+            </a:r>
+          </a:p>
+          <a:p>
+            <a:pPr lvl="1"/>
+            <a:r>
+              <a:rPr lang="en-US" dirty="0"/>
+              <a:t>Wrapper around coroutines</a:t>
+            </a:r>
+          </a:p>
+          <a:p>
+            <a:pPr lvl="1"/>
+            <a:r>
+              <a:rPr lang="en-US" dirty="0"/>
+              <a:t>Used to schedule functions on the event loop</a:t>
+            </a:r>
+          </a:p>
+        </p:txBody>
+      </p:sp>
+    </p:spTree>
+    <p:extLst>
+      <p:ext uri="{BB962C8B-B14F-4D97-AF65-F5344CB8AC3E}">
+        <p14:creationId xmlns:p14="http://schemas.microsoft.com/office/powerpoint/2010/main" val="3225133306"/>
+      </p:ext>
+    </p:extLst>
+  </p:cSld>
+  <p:clrMapOvr>
+    <a:masterClrMapping/>
+  </p:clrMapOvr>
+  <p:timing>
+    <p:tnLst>
+      <p:par>
+        <p:cTn id="1" dur="indefinite" restart="never" nodeType="tmRoot">
+          <p:childTnLst>
+            <p:seq concurrent="1" nextAc="seek">
+              <p:cTn id="2" dur="indefinite" nodeType="mainSeq">
+                <p:childTnLst>
+                  <p:par>
+                    <p:cTn id="3" fill="hold">
+                      <p:stCondLst>
+                        <p:cond delay="indefinite"/>
+                      </p:stCondLst>
+                      <p:childTnLst>
+                        <p:par>
+                          <p:cTn id="4" fill="hold">
+                            <p:stCondLst>
+                              <p:cond delay="0"/>
+                            </p:stCondLst>
+                            <p:childTnLst>
+                              <p:par>
+                                <p:cTn id="5" presetID="1" presetClass="entr" presetSubtype="0" fill="hold" grpId="0" nodeType="clickEffect">
+                                  <p:stCondLst>
+                                    <p:cond delay="0"/>
+                                  </p:stCondLst>
+                                  <p:childTnLst>
+                                    <p:set>
+                                      <p:cBhvr>
+                                        <p:cTn id="6" dur="1" fill="hold">
+                                          <p:stCondLst>
+                                            <p:cond delay="0"/>
+                                          </p:stCondLst>
+                                        </p:cTn>
+                                        <p:tgtEl>
+                                          <p:spTgt spid="4"/>
+                                        </p:tgtEl>
+                                        <p:attrNameLst>
+                                          <p:attrName>style.visibility</p:attrName>
+                                        </p:attrNameLst>
+                                      </p:cBhvr>
+                                      <p:to>
+                                        <p:strVal val="visible"/>
+                                      </p:to>
+                                    </p:set>
+                                  </p:childTnLst>
+                                </p:cTn>
+                              </p:par>
+                            </p:childTnLst>
+                          </p:cTn>
+                        </p:par>
+                      </p:childTnLst>
+                    </p:cTn>
+                  </p:par>
+                  <p:par>
+                    <p:cTn id="7" fill="hold">
+                      <p:stCondLst>
+                        <p:cond delay="indefinite"/>
+                      </p:stCondLst>
+                      <p:childTnLst>
+                        <p:par>
+                          <p:cTn id="8" fill="hold">
+                            <p:stCondLst>
+                              <p:cond delay="0"/>
+                            </p:stCondLst>
+                            <p:childTnLst>
+                              <p:par>
+                                <p:cTn id="9" presetID="1" presetClass="entr" presetSubtype="0" fill="hold" grpId="0" nodeType="clickEffect">
+                                  <p:stCondLst>
+                                    <p:cond delay="0"/>
+                                  </p:stCondLst>
+                                  <p:childTnLst>
+                                    <p:set>
+                                      <p:cBhvr>
+                                        <p:cTn id="10" dur="1" fill="hold">
+                                          <p:stCondLst>
+                                            <p:cond delay="0"/>
+                                          </p:stCondLst>
+                                        </p:cTn>
+                                        <p:tgtEl>
+                                          <p:spTgt spid="5"/>
+                                        </p:tgtEl>
+                                        <p:attrNameLst>
+                                          <p:attrName>style.visibility</p:attrName>
+                                        </p:attrNameLst>
+                                      </p:cBhvr>
+                                      <p:to>
+                                        <p:strVal val="visible"/>
+                                      </p:to>
+                                    </p:set>
+                                  </p:childTnLst>
+                                </p:cTn>
+                              </p:par>
+                            </p:childTnLst>
+                          </p:cTn>
+                        </p:par>
+                      </p:childTnLst>
+                    </p:cTn>
+                  </p:par>
+                  <p:par>
+                    <p:cTn id="11" fill="hold">
+                      <p:stCondLst>
+                        <p:cond delay="indefinite"/>
+                      </p:stCondLst>
+                      <p:childTnLst>
+                        <p:par>
+                          <p:cTn id="12" fill="hold">
+                            <p:stCondLst>
+                              <p:cond delay="0"/>
+                            </p:stCondLst>
+                            <p:childTnLst>
+                              <p:par>
+                                <p:cTn id="13" presetID="1" presetClass="entr" presetSubtype="0" fill="hold" grpId="0" nodeType="clickEffect">
+                                  <p:stCondLst>
+                                    <p:cond delay="0"/>
+                                  </p:stCondLst>
+                                  <p:childTnLst>
+                                    <p:set>
+                                      <p:cBhvr>
+                                        <p:cTn id="14" dur="1" fill="hold">
+                                          <p:stCondLst>
+                                            <p:cond delay="0"/>
+                                          </p:stCondLst>
+                                        </p:cTn>
+                                        <p:tgtEl>
+                                          <p:spTgt spid="6"/>
+                                        </p:tgtEl>
+                                        <p:attrNameLst>
+                                          <p:attrName>style.visibility</p:attrName>
+                                        </p:attrNameLst>
+                                      </p:cBhvr>
+                                      <p:to>
+                                        <p:strVal val="visible"/>
+                                      </p:to>
+                                    </p:set>
+                                  </p:childTnLst>
+                                </p:cTn>
+                              </p:par>
+                            </p:childTnLst>
+                          </p:cTn>
+                        </p:par>
+                      </p:childTnLst>
+                    </p:cTn>
+                  </p:par>
+                </p:childTnLst>
+              </p:cTn>
+              <p:prevCondLst>
+                <p:cond evt="onPrev" delay="0">
+                  <p:tgtEl>
+                    <p:sldTgt/>
+                  </p:tgtEl>
+                </p:cond>
+              </p:prevCondLst>
+              <p:nextCondLst>
+                <p:cond evt="onNext" delay="0">
+                  <p:tgtEl>
+                    <p:sldTgt/>
+                  </p:tgtEl>
+                </p:cond>
+              </p:nextCondLst>
+            </p:seq>
+          </p:childTnLst>
+        </p:cTn>
+      </p:par>
+    </p:tnLst>
+    <p:bldLst>
+      <p:bldP spid="4" grpId="0"/>
+      <p:bldP spid="5" grpId="0"/>
+      <p:bldP spid="6" grpId="0"/>
+    </p:bldLst>
+  </p:timing>
+</p:sld>
+</file>
+
+<file path=ppt/slides/slide11.xml><?xml version="1.0" encoding="utf-8"?>
+<p:sld xmlns:a="http://schemas.openxmlformats.org/drawingml/2006/main" xmlns:r="http://schemas.openxmlformats.org/officeDocument/2006/relationships" xmlns:p="http://schemas.openxmlformats.org/presentationml/2006/main">
+  <p:cSld>
+    <p:spTree>
+      <p:nvGrpSpPr>
+        <p:cNvPr id="1" name=""/>
+        <p:cNvGrpSpPr/>
+        <p:nvPr/>
+      </p:nvGrpSpPr>
+      <p:grpSpPr>
+        <a:xfrm>
+          <a:off x="0" y="0"/>
+          <a:ext cx="0" cy="0"/>
+          <a:chOff x="0" y="0"/>
+          <a:chExt cx="0" cy="0"/>
+        </a:xfrm>
+      </p:grpSpPr>
+      <p:sp>
+        <p:nvSpPr>
+          <p:cNvPr id="2" name="Title 1">
+            <a:extLst>
+              <a:ext uri="{FF2B5EF4-FFF2-40B4-BE49-F238E27FC236}">
+                <a16:creationId xmlns:a16="http://schemas.microsoft.com/office/drawing/2014/main" id="{9D33143F-6506-F349-AA9B-6E3ED09FF6BC}"/>
+              </a:ext>
+            </a:extLst>
+          </p:cNvPr>
+          <p:cNvSpPr>
+            <a:spLocks noGrp="1"/>
+          </p:cNvSpPr>
+          <p:nvPr>
+            <p:ph type="title"/>
+          </p:nvPr>
+        </p:nvSpPr>
+        <p:spPr/>
+        <p:txBody>
+          <a:bodyPr/>
+          <a:lstStyle/>
+          <a:p>
+            <a:pPr algn="ctr"/>
+            <a:r>
+              <a:rPr lang="en-US" dirty="0" err="1"/>
+              <a:t>Asyncio</a:t>
+            </a:r>
+            <a:endParaRPr lang="en-US" dirty="0"/>
+          </a:p>
+        </p:txBody>
+      </p:sp>
+      <p:sp>
+        <p:nvSpPr>
+          <p:cNvPr id="3" name="Content Placeholder 2">
+            <a:extLst>
+              <a:ext uri="{FF2B5EF4-FFF2-40B4-BE49-F238E27FC236}">
+                <a16:creationId xmlns:a16="http://schemas.microsoft.com/office/drawing/2014/main" id="{A4E5535F-612D-1F4D-BF58-05AF3FE585C3}"/>
+              </a:ext>
+            </a:extLst>
+          </p:cNvPr>
+          <p:cNvSpPr>
+            <a:spLocks noGrp="1"/>
+          </p:cNvSpPr>
+          <p:nvPr>
+            <p:ph idx="1"/>
+          </p:nvPr>
+        </p:nvSpPr>
+        <p:spPr/>
+        <p:txBody>
+          <a:bodyPr>
+            <a:normAutofit fontScale="92500" lnSpcReduction="20000"/>
+          </a:bodyPr>
+          <a:lstStyle/>
+          <a:p>
+            <a:r>
+              <a:rPr lang="en-US" dirty="0"/>
+              <a:t>The process:</a:t>
+            </a:r>
+          </a:p>
+          <a:p>
+            <a:pPr lvl="1"/>
+            <a:r>
+              <a:rPr lang="en-US" dirty="0"/>
+              <a:t>Create an event loop</a:t>
+            </a:r>
+          </a:p>
+          <a:p>
+            <a:pPr lvl="1"/>
+            <a:r>
+              <a:rPr lang="en-US" dirty="0"/>
+              <a:t>Functions are changed to coroutines where required</a:t>
+            </a:r>
+          </a:p>
+          <a:p>
+            <a:pPr lvl="2"/>
+            <a:r>
+              <a:rPr lang="en-US" dirty="0"/>
+              <a:t>Non blocking IO can be awaited</a:t>
+            </a:r>
+          </a:p>
+          <a:p>
+            <a:pPr lvl="2"/>
+            <a:r>
+              <a:rPr lang="en-US" dirty="0"/>
+              <a:t>Blocking IO or </a:t>
+            </a:r>
+            <a:r>
+              <a:rPr lang="en-US" dirty="0" err="1"/>
+              <a:t>cpu</a:t>
+            </a:r>
+            <a:r>
+              <a:rPr lang="en-US" dirty="0"/>
+              <a:t> tasks:</a:t>
+            </a:r>
+          </a:p>
+          <a:p>
+            <a:pPr lvl="3"/>
+            <a:r>
+              <a:rPr lang="en-US" dirty="0"/>
+              <a:t>a</a:t>
+            </a:r>
+            <a:r>
+              <a:rPr lang="en-US" i="1" dirty="0"/>
+              <a:t>wait </a:t>
+            </a:r>
+            <a:r>
+              <a:rPr lang="en-US" i="1" dirty="0" err="1"/>
+              <a:t>ThreadPoolExecutor</a:t>
+            </a:r>
+            <a:endParaRPr lang="en-US" i="1" dirty="0"/>
+          </a:p>
+          <a:p>
+            <a:pPr lvl="3"/>
+            <a:r>
+              <a:rPr lang="en-US" dirty="0"/>
+              <a:t>a</a:t>
+            </a:r>
+            <a:r>
+              <a:rPr lang="en-US" i="1" dirty="0"/>
+              <a:t>wait </a:t>
+            </a:r>
+            <a:r>
+              <a:rPr lang="en-US" i="1" dirty="0" err="1"/>
+              <a:t>ProcessPoolExecutor</a:t>
+            </a:r>
+            <a:endParaRPr lang="en-US" i="1" dirty="0"/>
+          </a:p>
+          <a:p>
+            <a:pPr lvl="3"/>
+            <a:endParaRPr lang="en-US" i="1" dirty="0"/>
+          </a:p>
+          <a:p>
+            <a:pPr lvl="1"/>
+            <a:r>
+              <a:rPr lang="en-US" dirty="0"/>
+              <a:t>Create tasks from the coroutines and add them to the event loop</a:t>
+            </a:r>
+          </a:p>
+          <a:p>
+            <a:pPr lvl="1"/>
+            <a:r>
+              <a:rPr lang="en-US" i="1" dirty="0"/>
+              <a:t>When a coroutine awaits, control is given back to the event loop</a:t>
+            </a:r>
+          </a:p>
+          <a:p>
+            <a:pPr lvl="1"/>
+            <a:r>
+              <a:rPr lang="en-US" dirty="0"/>
+              <a:t>The event loop moves to the next task</a:t>
+            </a:r>
+          </a:p>
+          <a:p>
+            <a:pPr lvl="1"/>
+            <a:r>
+              <a:rPr lang="en-US" i="1" dirty="0"/>
+              <a:t>The event loop is notified when an awaited task returns</a:t>
+            </a:r>
+          </a:p>
+          <a:p>
+            <a:pPr lvl="1"/>
+            <a:endParaRPr lang="en-US" dirty="0"/>
+          </a:p>
+          <a:p>
+            <a:pPr lvl="1"/>
+            <a:endParaRPr lang="en-US" dirty="0"/>
+          </a:p>
+          <a:p>
+            <a:pPr lvl="1"/>
+            <a:endParaRPr lang="en-US" dirty="0"/>
+          </a:p>
+        </p:txBody>
+      </p:sp>
+    </p:spTree>
+    <p:extLst>
+      <p:ext uri="{BB962C8B-B14F-4D97-AF65-F5344CB8AC3E}">
+        <p14:creationId xmlns:p14="http://schemas.microsoft.com/office/powerpoint/2010/main" val="3148043834"/>
+      </p:ext>
+    </p:extLst>
+  </p:cSld>
+  <p:clrMapOvr>
+    <a:masterClrMapping/>
+  </p:clrMapOvr>
+  <p:timing>
+    <p:tnLst>
+      <p:par>
+        <p:cTn id="1" dur="indefinite" restart="never" nodeType="tmRoot">
+          <p:childTnLst>
+            <p:seq concurrent="1" nextAc="seek">
+              <p:cTn id="2" dur="indefinite" nodeType="mainSeq">
+                <p:childTnLst>
+                  <p:par>
+                    <p:cTn id="3" fill="hold">
+                      <p:stCondLst>
+                        <p:cond delay="indefinite"/>
+                      </p:stCondLst>
+                      <p:childTnLst>
+                        <p:par>
+                          <p:cTn id="4" fill="hold">
+                            <p:stCondLst>
+                              <p:cond delay="0"/>
+                            </p:stCondLst>
+                            <p:childTnLst>
+                              <p:par>
+                                <p:cTn id="5" presetID="1" presetClass="entr" presetSubtype="0" fill="hold" grpId="0" nodeType="clickEffect">
+                                  <p:stCondLst>
+                                    <p:cond delay="0"/>
+                                  </p:stCondLst>
+                                  <p:childTnLst>
+                                    <p:set>
+                                      <p:cBhvr>
+                                        <p:cTn id="6" dur="1" fill="hold">
+                                          <p:stCondLst>
+                                            <p:cond delay="0"/>
+                                          </p:stCondLst>
+                                        </p:cTn>
+                                        <p:tgtEl>
+                                          <p:spTgt spid="3">
+                                            <p:txEl>
+                                              <p:pRg st="0" end="0"/>
+                                            </p:txEl>
+                                          </p:spTgt>
+                                        </p:tgtEl>
+                                        <p:attrNameLst>
+                                          <p:attrName>style.visibility</p:attrName>
+                                        </p:attrNameLst>
+                                      </p:cBhvr>
+                                      <p:to>
+                                        <p:strVal val="visible"/>
+                                      </p:to>
+                                    </p:set>
+                                  </p:childTnLst>
+                                </p:cTn>
+                              </p:par>
+                            </p:childTnLst>
+                          </p:cTn>
+                        </p:par>
+                      </p:childTnLst>
+                    </p:cTn>
+                  </p:par>
+                  <p:par>
+                    <p:cTn id="7" fill="hold">
+                      <p:stCondLst>
+                        <p:cond delay="indefinite"/>
+                      </p:stCondLst>
+                      <p:childTnLst>
+                        <p:par>
+                          <p:cTn id="8" fill="hold">
+                            <p:stCondLst>
+                              <p:cond delay="0"/>
+                            </p:stCondLst>
+                            <p:childTnLst>
+                              <p:par>
+                                <p:cTn id="9" presetID="1" presetClass="entr" presetSubtype="0" fill="hold" grpId="0" nodeType="clickEffect">
+                                  <p:stCondLst>
+                                    <p:cond delay="0"/>
+                                  </p:stCondLst>
+                                  <p:childTnLst>
+                                    <p:set>
+                                      <p:cBhvr>
+                                        <p:cTn id="10" dur="1" fill="hold">
+                                          <p:stCondLst>
+                                            <p:cond delay="0"/>
+                                          </p:stCondLst>
+                                        </p:cTn>
+                                        <p:tgtEl>
+                                          <p:spTgt spid="3">
+                                            <p:txEl>
+                                              <p:pRg st="1" end="1"/>
+                                            </p:txEl>
+                                          </p:spTgt>
+                                        </p:tgtEl>
+                                        <p:attrNameLst>
+                                          <p:attrName>style.visibility</p:attrName>
+                                        </p:attrNameLst>
+                                      </p:cBhvr>
+                                      <p:to>
+                                        <p:strVal val="visible"/>
+                                      </p:to>
+                                    </p:set>
+                                  </p:childTnLst>
+                                </p:cTn>
+                              </p:par>
+                            </p:childTnLst>
+                          </p:cTn>
+                        </p:par>
+                      </p:childTnLst>
+                    </p:cTn>
+                  </p:par>
+                  <p:par>
+                    <p:cTn id="11" fill="hold">
+                      <p:stCondLst>
+                        <p:cond delay="indefinite"/>
+                      </p:stCondLst>
+                      <p:childTnLst>
+                        <p:par>
+                          <p:cTn id="12" fill="hold">
+                            <p:stCondLst>
+                              <p:cond delay="0"/>
+                            </p:stCondLst>
+                            <p:childTnLst>
+                              <p:par>
+                                <p:cTn id="13" presetID="1" presetClass="entr" presetSubtype="0" fill="hold" grpId="0" nodeType="clickEffect">
+                                  <p:stCondLst>
+                                    <p:cond delay="0"/>
+                                  </p:stCondLst>
+                                  <p:childTnLst>
+                                    <p:set>
+                                      <p:cBhvr>
+                                        <p:cTn id="14" dur="1" fill="hold">
+                                          <p:stCondLst>
+                                            <p:cond delay="0"/>
+                                          </p:stCondLst>
+                                        </p:cTn>
+                                        <p:tgtEl>
+                                          <p:spTgt spid="3">
+                                            <p:txEl>
+                                              <p:pRg st="2" end="2"/>
+                                            </p:txEl>
+                                          </p:spTgt>
+                                        </p:tgtEl>
+                                        <p:attrNameLst>
+                                          <p:attrName>style.visibility</p:attrName>
+                                        </p:attrNameLst>
+                                      </p:cBhvr>
+                                      <p:to>
+                                        <p:strVal val="visible"/>
+                                      </p:to>
+                                    </p:set>
+                                  </p:childTnLst>
+                                </p:cTn>
+                              </p:par>
+                              <p:par>
+                                <p:cTn id="15" presetID="1" presetClass="entr" presetSubtype="0" fill="hold" grpId="0" nodeType="withEffect">
+                                  <p:stCondLst>
+                                    <p:cond delay="0"/>
+                                  </p:stCondLst>
+                                  <p:childTnLst>
+                                    <p:set>
+                                      <p:cBhvr>
+                                        <p:cTn id="16" dur="1" fill="hold">
+                                          <p:stCondLst>
+                                            <p:cond delay="0"/>
+                                          </p:stCondLst>
+                                        </p:cTn>
+                                        <p:tgtEl>
+                                          <p:spTgt spid="3">
+                                            <p:txEl>
+                                              <p:pRg st="3" end="3"/>
+                                            </p:txEl>
+                                          </p:spTgt>
+                                        </p:tgtEl>
+                                        <p:attrNameLst>
+                                          <p:attrName>style.visibility</p:attrName>
+                                        </p:attrNameLst>
+                                      </p:cBhvr>
+                                      <p:to>
+                                        <p:strVal val="visible"/>
+                                      </p:to>
+                                    </p:set>
+                                  </p:childTnLst>
+                                </p:cTn>
+                              </p:par>
+                              <p:par>
+                                <p:cTn id="17" presetID="1" presetClass="entr" presetSubtype="0" fill="hold" grpId="0" nodeType="withEffect">
+                                  <p:stCondLst>
+                                    <p:cond delay="0"/>
+                                  </p:stCondLst>
+                                  <p:childTnLst>
+                                    <p:set>
+                                      <p:cBhvr>
+                                        <p:cTn id="18" dur="1" fill="hold">
+                                          <p:stCondLst>
+                                            <p:cond delay="0"/>
+                                          </p:stCondLst>
+                                        </p:cTn>
+                                        <p:tgtEl>
+                                          <p:spTgt spid="3">
+                                            <p:txEl>
+                                              <p:pRg st="4" end="4"/>
+                                            </p:txEl>
+                                          </p:spTgt>
+                                        </p:tgtEl>
+                                        <p:attrNameLst>
+                                          <p:attrName>style.visibility</p:attrName>
+                                        </p:attrNameLst>
+                                      </p:cBhvr>
+                                      <p:to>
+                                        <p:strVal val="visible"/>
+                                      </p:to>
+                                    </p:set>
+                                  </p:childTnLst>
+                                </p:cTn>
+                              </p:par>
+                              <p:par>
+                                <p:cTn id="19" presetID="1" presetClass="entr" presetSubtype="0" fill="hold" grpId="0" nodeType="withEffect">
+                                  <p:stCondLst>
+                                    <p:cond delay="0"/>
+                                  </p:stCondLst>
+                                  <p:childTnLst>
+                                    <p:set>
+                                      <p:cBhvr>
+                                        <p:cTn id="20" dur="1" fill="hold">
+                                          <p:stCondLst>
+                                            <p:cond delay="0"/>
+                                          </p:stCondLst>
+                                        </p:cTn>
+                                        <p:tgtEl>
+                                          <p:spTgt spid="3">
+                                            <p:txEl>
+                                              <p:pRg st="5" end="5"/>
+                                            </p:txEl>
+                                          </p:spTgt>
+                                        </p:tgtEl>
+                                        <p:attrNameLst>
+                                          <p:attrName>style.visibility</p:attrName>
+                                        </p:attrNameLst>
+                                      </p:cBhvr>
+                                      <p:to>
+                                        <p:strVal val="visible"/>
+                                      </p:to>
+                                    </p:set>
+                                  </p:childTnLst>
+                                </p:cTn>
+                              </p:par>
+                              <p:par>
+                                <p:cTn id="21" presetID="1" presetClass="entr" presetSubtype="0" fill="hold" grpId="0" nodeType="withEffect">
+                                  <p:stCondLst>
+                                    <p:cond delay="0"/>
+                                  </p:stCondLst>
+                                  <p:childTnLst>
+                                    <p:set>
+                                      <p:cBhvr>
+                                        <p:cTn id="22" dur="1" fill="hold">
+                                          <p:stCondLst>
+                                            <p:cond delay="0"/>
+                                          </p:stCondLst>
+                                        </p:cTn>
+                                        <p:tgtEl>
+                                          <p:spTgt spid="3">
+                                            <p:txEl>
+                                              <p:pRg st="6" end="6"/>
+                                            </p:txEl>
+                                          </p:spTgt>
+                                        </p:tgtEl>
+                                        <p:attrNameLst>
+                                          <p:attrName>style.visibility</p:attrName>
+                                        </p:attrNameLst>
+                                      </p:cBhvr>
+                                      <p:to>
+                                        <p:strVal val="visible"/>
+                                      </p:to>
+                                    </p:set>
+                                  </p:childTnLst>
+                                </p:cTn>
+                              </p:par>
+                            </p:childTnLst>
+                          </p:cTn>
+                        </p:par>
+                      </p:childTnLst>
+                    </p:cTn>
+                  </p:par>
+                  <p:par>
+                    <p:cTn id="23" fill="hold">
+                      <p:stCondLst>
+                        <p:cond delay="indefinite"/>
+                      </p:stCondLst>
+                      <p:childTnLst>
+                        <p:par>
+                          <p:cTn id="24" fill="hold">
+                            <p:stCondLst>
+                              <p:cond delay="0"/>
+                            </p:stCondLst>
+                            <p:childTnLst>
+                              <p:par>
+                                <p:cTn id="25" presetID="1" presetClass="entr" presetSubtype="0" fill="hold" grpId="0" nodeType="clickEffect">
+                                  <p:stCondLst>
+                                    <p:cond delay="0"/>
+                                  </p:stCondLst>
+                                  <p:childTnLst>
+                                    <p:set>
+                                      <p:cBhvr>
+                                        <p:cTn id="26" dur="1" fill="hold">
+                                          <p:stCondLst>
+                                            <p:cond delay="0"/>
+                                          </p:stCondLst>
+                                        </p:cTn>
+                                        <p:tgtEl>
+                                          <p:spTgt spid="3">
+                                            <p:txEl>
+                                              <p:pRg st="8" end="8"/>
+                                            </p:txEl>
+                                          </p:spTgt>
+                                        </p:tgtEl>
+                                        <p:attrNameLst>
+                                          <p:attrName>style.visibility</p:attrName>
+                                        </p:attrNameLst>
+                                      </p:cBhvr>
+                                      <p:to>
+                                        <p:strVal val="visible"/>
+                                      </p:to>
+                                    </p:set>
+                                  </p:childTnLst>
+                                </p:cTn>
+                              </p:par>
+                            </p:childTnLst>
+                          </p:cTn>
+                        </p:par>
+                      </p:childTnLst>
+                    </p:cTn>
+                  </p:par>
+                  <p:par>
+                    <p:cTn id="27" fill="hold">
+                      <p:stCondLst>
+                        <p:cond delay="indefinite"/>
+                      </p:stCondLst>
+                      <p:childTnLst>
+                        <p:par>
+                          <p:cTn id="28" fill="hold">
+                            <p:stCondLst>
+                              <p:cond delay="0"/>
+                            </p:stCondLst>
+                            <p:childTnLst>
+                              <p:par>
+                                <p:cTn id="29" presetID="1" presetClass="entr" presetSubtype="0" fill="hold" grpId="0" nodeType="clickEffect">
+                                  <p:stCondLst>
+                                    <p:cond delay="0"/>
+                                  </p:stCondLst>
+                                  <p:childTnLst>
+                                    <p:set>
+                                      <p:cBhvr>
+                                        <p:cTn id="30" dur="1" fill="hold">
+                                          <p:stCondLst>
+                                            <p:cond delay="0"/>
+                                          </p:stCondLst>
+                                        </p:cTn>
+                                        <p:tgtEl>
+                                          <p:spTgt spid="3">
+                                            <p:txEl>
+                                              <p:pRg st="9" end="9"/>
+                                            </p:txEl>
+                                          </p:spTgt>
+                                        </p:tgtEl>
+                                        <p:attrNameLst>
+                                          <p:attrName>style.visibility</p:attrName>
+                                        </p:attrNameLst>
+                                      </p:cBhvr>
+                                      <p:to>
+                                        <p:strVal val="visible"/>
+                                      </p:to>
+                                    </p:set>
+                                  </p:childTnLst>
+                                </p:cTn>
+                              </p:par>
+                            </p:childTnLst>
+                          </p:cTn>
+                        </p:par>
+                      </p:childTnLst>
+                    </p:cTn>
+                  </p:par>
+                  <p:par>
+                    <p:cTn id="31" fill="hold">
+                      <p:stCondLst>
+                        <p:cond delay="indefinite"/>
+                      </p:stCondLst>
+                      <p:childTnLst>
+                        <p:par>
+                          <p:cTn id="32" fill="hold">
+                            <p:stCondLst>
+                              <p:cond delay="0"/>
+                            </p:stCondLst>
+                            <p:childTnLst>
+                              <p:par>
+                                <p:cTn id="33" presetID="1" presetClass="entr" presetSubtype="0" fill="hold" grpId="0" nodeType="clickEffect">
+                                  <p:stCondLst>
+                                    <p:cond delay="0"/>
+                                  </p:stCondLst>
+                                  <p:childTnLst>
+                                    <p:set>
+                                      <p:cBhvr>
+                                        <p:cTn id="34" dur="1" fill="hold">
+                                          <p:stCondLst>
+                                            <p:cond delay="0"/>
+                                          </p:stCondLst>
+                                        </p:cTn>
+                                        <p:tgtEl>
+                                          <p:spTgt spid="3">
+                                            <p:txEl>
+                                              <p:pRg st="10" end="10"/>
+                                            </p:txEl>
+                                          </p:spTgt>
+                                        </p:tgtEl>
+                                        <p:attrNameLst>
+                                          <p:attrName>style.visibility</p:attrName>
+                                        </p:attrNameLst>
+                                      </p:cBhvr>
+                                      <p:to>
+                                        <p:strVal val="visible"/>
+                                      </p:to>
+                                    </p:set>
+                                  </p:childTnLst>
+                                </p:cTn>
+                              </p:par>
+                            </p:childTnLst>
+                          </p:cTn>
+                        </p:par>
+                      </p:childTnLst>
+                    </p:cTn>
+                  </p:par>
+                  <p:par>
+                    <p:cTn id="35" fill="hold">
+                      <p:stCondLst>
+                        <p:cond delay="indefinite"/>
+                      </p:stCondLst>
+                      <p:childTnLst>
+                        <p:par>
+                          <p:cTn id="36" fill="hold">
+                            <p:stCondLst>
+                              <p:cond delay="0"/>
+                            </p:stCondLst>
+                            <p:childTnLst>
+                              <p:par>
+                                <p:cTn id="37" presetID="1" presetClass="entr" presetSubtype="0" fill="hold" grpId="0" nodeType="clickEffect">
+                                  <p:stCondLst>
+                                    <p:cond delay="0"/>
+                                  </p:stCondLst>
+                                  <p:childTnLst>
+                                    <p:set>
+                                      <p:cBhvr>
+                                        <p:cTn id="38" dur="1" fill="hold">
+                                          <p:stCondLst>
+                                            <p:cond delay="0"/>
+                                          </p:stCondLst>
+                                        </p:cTn>
+                                        <p:tgtEl>
+                                          <p:spTgt spid="3">
+                                            <p:txEl>
+                                              <p:pRg st="11" end="11"/>
+                                            </p:txEl>
+                                          </p:spTgt>
+                                        </p:tgtEl>
+                                        <p:attrNameLst>
+                                          <p:attrName>style.visibility</p:attrName>
+                                        </p:attrNameLst>
+                                      </p:cBhvr>
+                                      <p:to>
+                                        <p:strVal val="visible"/>
+                                      </p:to>
+                                    </p:set>
+                                  </p:childTnLst>
+                                </p:cTn>
+                              </p:par>
+                            </p:childTnLst>
+                          </p:cTn>
+                        </p:par>
+                      </p:childTnLst>
+                    </p:cTn>
+                  </p:par>
+                </p:childTnLst>
+              </p:cTn>
+              <p:prevCondLst>
+                <p:cond evt="onPrev" delay="0">
+                  <p:tgtEl>
+                    <p:sldTgt/>
+                  </p:tgtEl>
+                </p:cond>
+              </p:prevCondLst>
+              <p:nextCondLst>
+                <p:cond evt="onNext" delay="0">
+                  <p:tgtEl>
+                    <p:sldTgt/>
+                  </p:tgtEl>
+                </p:cond>
+              </p:nextCondLst>
+            </p:seq>
+          </p:childTnLst>
+        </p:cTn>
+      </p:par>
+    </p:tnLst>
+    <p:bldLst>
+      <p:bldP spid="3" grpId="0" uiExpand="1" build="p"/>
+    </p:bldLst>
+  </p:timing>
+</p:sld>
+</file>
+
+<file path=ppt/slides/slide12.xml><?xml version="1.0" encoding="utf-8"?>
+<p:sld xmlns:a="http://schemas.openxmlformats.org/drawingml/2006/main" xmlns:r="http://schemas.openxmlformats.org/officeDocument/2006/relationships" xmlns:p="http://schemas.openxmlformats.org/presentationml/2006/main">
+  <p:cSld>
+    <p:spTree>
+      <p:nvGrpSpPr>
+        <p:cNvPr id="1" name=""/>
+        <p:cNvGrpSpPr/>
+        <p:nvPr/>
+      </p:nvGrpSpPr>
+      <p:grpSpPr>
+        <a:xfrm>
+          <a:off x="0" y="0"/>
+          <a:ext cx="0" cy="0"/>
+          <a:chOff x="0" y="0"/>
+          <a:chExt cx="0" cy="0"/>
+        </a:xfrm>
+      </p:grpSpPr>
+      <p:sp>
+        <p:nvSpPr>
+          <p:cNvPr id="2" name="Title 1">
+            <a:extLst>
+              <a:ext uri="{FF2B5EF4-FFF2-40B4-BE49-F238E27FC236}">
+                <a16:creationId xmlns:a16="http://schemas.microsoft.com/office/drawing/2014/main" id="{A6422C9B-CA38-D244-ADD3-0A1456C5D5E3}"/>
+              </a:ext>
+            </a:extLst>
+          </p:cNvPr>
+          <p:cNvSpPr>
+            <a:spLocks noGrp="1"/>
+          </p:cNvSpPr>
+          <p:nvPr>
+            <p:ph type="title"/>
+          </p:nvPr>
+        </p:nvSpPr>
+        <p:spPr/>
+        <p:txBody>
+          <a:bodyPr/>
+          <a:lstStyle/>
+          <a:p>
+            <a:pPr algn="ctr"/>
+            <a:r>
+              <a:rPr lang="en-US" dirty="0"/>
+              <a:t>Use Cases</a:t>
+            </a:r>
+          </a:p>
+        </p:txBody>
+      </p:sp>
+      <p:sp>
+        <p:nvSpPr>
+          <p:cNvPr id="3" name="Content Placeholder 2">
+            <a:extLst>
+              <a:ext uri="{FF2B5EF4-FFF2-40B4-BE49-F238E27FC236}">
+                <a16:creationId xmlns:a16="http://schemas.microsoft.com/office/drawing/2014/main" id="{779EF6B7-89C9-5149-9DDF-424FC378FC2F}"/>
+              </a:ext>
+            </a:extLst>
+          </p:cNvPr>
+          <p:cNvSpPr>
+            <a:spLocks noGrp="1"/>
+          </p:cNvSpPr>
+          <p:nvPr>
+            <p:ph idx="1"/>
+          </p:nvPr>
+        </p:nvSpPr>
+        <p:spPr/>
+        <p:txBody>
+          <a:bodyPr/>
+          <a:lstStyle/>
+          <a:p>
+            <a:r>
+              <a:rPr lang="en-US" dirty="0"/>
+              <a:t>CPU bound: Multiprocessing</a:t>
+            </a:r>
+          </a:p>
+          <a:p>
+            <a:endParaRPr lang="en-US" dirty="0"/>
+          </a:p>
+          <a:p>
+            <a:r>
+              <a:rPr lang="en-US" dirty="0"/>
+              <a:t>IO bound, fast IO, limited concurrency required: Threads</a:t>
+            </a:r>
+          </a:p>
+          <a:p>
+            <a:endParaRPr lang="en-US" dirty="0"/>
+          </a:p>
+          <a:p>
+            <a:r>
+              <a:rPr lang="en-US" dirty="0"/>
+              <a:t>IO bound, fast or slow IO, high concurrency required: </a:t>
+            </a:r>
+            <a:r>
+              <a:rPr lang="en-US" dirty="0" err="1"/>
+              <a:t>Asyncio</a:t>
+            </a:r>
+            <a:endParaRPr lang="en-US" dirty="0"/>
+          </a:p>
+        </p:txBody>
+      </p:sp>
+    </p:spTree>
+    <p:extLst>
+      <p:ext uri="{BB962C8B-B14F-4D97-AF65-F5344CB8AC3E}">
+        <p14:creationId xmlns:p14="http://schemas.microsoft.com/office/powerpoint/2010/main" val="2109509265"/>
+      </p:ext>
+    </p:extLst>
+  </p:cSld>
+  <p:clrMapOvr>
+    <a:masterClrMapping/>
+  </p:clrMapOvr>
+  <p:timing>
+    <p:tnLst>
+      <p:par>
+        <p:cTn id="1" dur="indefinite" restart="never" nodeType="tmRoot">
+          <p:childTnLst>
+            <p:seq concurrent="1" nextAc="seek">
+              <p:cTn id="2" dur="indefinite" nodeType="mainSeq">
+                <p:childTnLst>
+                  <p:par>
+                    <p:cTn id="3" fill="hold">
+                      <p:stCondLst>
+                        <p:cond delay="indefinite"/>
+                      </p:stCondLst>
+                      <p:childTnLst>
+                        <p:par>
+                          <p:cTn id="4" fill="hold">
+                            <p:stCondLst>
+                              <p:cond delay="0"/>
+                            </p:stCondLst>
+                            <p:childTnLst>
+                              <p:par>
+                                <p:cTn id="5" presetID="1" presetClass="entr" presetSubtype="0" fill="hold" grpId="0" nodeType="clickEffect">
+                                  <p:stCondLst>
+                                    <p:cond delay="0"/>
+                                  </p:stCondLst>
+                                  <p:childTnLst>
+                                    <p:set>
+                                      <p:cBhvr>
+                                        <p:cTn id="6" dur="1" fill="hold">
+                                          <p:stCondLst>
+                                            <p:cond delay="0"/>
+                                          </p:stCondLst>
+                                        </p:cTn>
+                                        <p:tgtEl>
+                                          <p:spTgt spid="3">
+                                            <p:txEl>
+                                              <p:pRg st="0" end="0"/>
+                                            </p:txEl>
+                                          </p:spTgt>
+                                        </p:tgtEl>
+                                        <p:attrNameLst>
+                                          <p:attrName>style.visibility</p:attrName>
+                                        </p:attrNameLst>
+                                      </p:cBhvr>
+                                      <p:to>
+                                        <p:strVal val="visible"/>
+                                      </p:to>
+                                    </p:set>
+                                  </p:childTnLst>
+                                </p:cTn>
+                              </p:par>
+                            </p:childTnLst>
+                          </p:cTn>
+                        </p:par>
+                      </p:childTnLst>
+                    </p:cTn>
+                  </p:par>
+                  <p:par>
+                    <p:cTn id="7" fill="hold">
+                      <p:stCondLst>
+                        <p:cond delay="indefinite"/>
+                      </p:stCondLst>
+                      <p:childTnLst>
+                        <p:par>
+                          <p:cTn id="8" fill="hold">
+                            <p:stCondLst>
+                              <p:cond delay="0"/>
+                            </p:stCondLst>
+                            <p:childTnLst>
+                              <p:par>
+                                <p:cTn id="9" presetID="1" presetClass="entr" presetSubtype="0" fill="hold" grpId="0" nodeType="clickEffect">
+                                  <p:stCondLst>
+                                    <p:cond delay="0"/>
+                                  </p:stCondLst>
+                                  <p:childTnLst>
+                                    <p:set>
+                                      <p:cBhvr>
+                                        <p:cTn id="10" dur="1" fill="hold">
+                                          <p:stCondLst>
+                                            <p:cond delay="0"/>
+                                          </p:stCondLst>
+                                        </p:cTn>
+                                        <p:tgtEl>
+                                          <p:spTgt spid="3">
+                                            <p:txEl>
+                                              <p:pRg st="2" end="2"/>
+                                            </p:txEl>
+                                          </p:spTgt>
+                                        </p:tgtEl>
+                                        <p:attrNameLst>
+                                          <p:attrName>style.visibility</p:attrName>
+                                        </p:attrNameLst>
+                                      </p:cBhvr>
+                                      <p:to>
+                                        <p:strVal val="visible"/>
+                                      </p:to>
+                                    </p:set>
+                                  </p:childTnLst>
+                                </p:cTn>
+                              </p:par>
+                            </p:childTnLst>
+                          </p:cTn>
+                        </p:par>
+                      </p:childTnLst>
+                    </p:cTn>
+                  </p:par>
+                  <p:par>
+                    <p:cTn id="11" fill="hold">
+                      <p:stCondLst>
+                        <p:cond delay="indefinite"/>
+                      </p:stCondLst>
+                      <p:childTnLst>
+                        <p:par>
+                          <p:cTn id="12" fill="hold">
+                            <p:stCondLst>
+                              <p:cond delay="0"/>
+                            </p:stCondLst>
+                            <p:childTnLst>
+                              <p:par>
+                                <p:cTn id="13" presetID="1" presetClass="entr" presetSubtype="0" fill="hold" grpId="0" nodeType="clickEffect">
+                                  <p:stCondLst>
+                                    <p:cond delay="0"/>
+                                  </p:stCondLst>
+                                  <p:childTnLst>
+                                    <p:set>
+                                      <p:cBhvr>
+                                        <p:cTn id="14" dur="1" fill="hold">
+                                          <p:stCondLst>
+                                            <p:cond delay="0"/>
+                                          </p:stCondLst>
+                                        </p:cTn>
+                                        <p:tgtEl>
+                                          <p:spTgt spid="3">
+                                            <p:txEl>
+                                              <p:pRg st="4" end="4"/>
+                                            </p:txEl>
+                                          </p:spTgt>
+                                        </p:tgtEl>
+                                        <p:attrNameLst>
+                                          <p:attrName>style.visibility</p:attrName>
+                                        </p:attrNameLst>
+                                      </p:cBhvr>
+                                      <p:to>
+                                        <p:strVal val="visible"/>
+                                      </p:to>
+                                    </p:set>
+                                  </p:childTnLst>
+                                </p:cTn>
+                              </p:par>
+                            </p:childTnLst>
+                          </p:cTn>
+                        </p:par>
+                      </p:childTnLst>
+                    </p:cTn>
+                  </p:par>
+                </p:childTnLst>
+              </p:cTn>
+              <p:prevCondLst>
+                <p:cond evt="onPrev" delay="0">
+                  <p:tgtEl>
+                    <p:sldTgt/>
+                  </p:tgtEl>
+                </p:cond>
+              </p:prevCondLst>
+              <p:nextCondLst>
+                <p:cond evt="onNext" delay="0">
+                  <p:tgtEl>
+                    <p:sldTgt/>
+                  </p:tgtEl>
+                </p:cond>
+              </p:nextCondLst>
+            </p:seq>
+          </p:childTnLst>
+        </p:cTn>
+      </p:par>
+    </p:tnLst>
+    <p:bldLst>
+      <p:bldP spid="3" grpId="0" uiExpand="1" build="p"/>
+    </p:bldLst>
+  </p:timing>
+</p:sld>
+</file>
+
+<file path=ppt/slides/slide13.xml><?xml version="1.0" encoding="utf-8"?>
+<p:sld xmlns:a="http://schemas.openxmlformats.org/drawingml/2006/main" xmlns:r="http://schemas.openxmlformats.org/officeDocument/2006/relationships" xmlns:p="http://schemas.openxmlformats.org/presentationml/2006/main">
+  <p:cSld>
+    <p:spTree>
+      <p:nvGrpSpPr>
+        <p:cNvPr id="1" name=""/>
+        <p:cNvGrpSpPr/>
+        <p:nvPr/>
+      </p:nvGrpSpPr>
+      <p:grpSpPr>
+        <a:xfrm>
+          <a:off x="0" y="0"/>
+          <a:ext cx="0" cy="0"/>
+          <a:chOff x="0" y="0"/>
+          <a:chExt cx="0" cy="0"/>
+        </a:xfrm>
+      </p:grpSpPr>
+      <p:sp>
+        <p:nvSpPr>
+          <p:cNvPr id="2" name="Title 1">
+            <a:extLst>
+              <a:ext uri="{FF2B5EF4-FFF2-40B4-BE49-F238E27FC236}">
+                <a16:creationId xmlns:a16="http://schemas.microsoft.com/office/drawing/2014/main" id="{AEE72D21-3668-6E43-9557-2DCF094B2D99}"/>
+              </a:ext>
+            </a:extLst>
+          </p:cNvPr>
+          <p:cNvSpPr>
+            <a:spLocks noGrp="1"/>
+          </p:cNvSpPr>
+          <p:nvPr>
+            <p:ph type="title"/>
+          </p:nvPr>
+        </p:nvSpPr>
+        <p:spPr>
+          <a:xfrm>
+            <a:off x="4500563" y="2443163"/>
+            <a:ext cx="4014788" cy="1257300"/>
+          </a:xfrm>
+        </p:spPr>
+        <p:txBody>
+          <a:bodyPr/>
+          <a:lstStyle/>
+          <a:p>
+            <a:r>
+              <a:rPr lang="en-US" dirty="0"/>
+              <a:t>import demo</a:t>
+            </a:r>
+          </a:p>
+        </p:txBody>
+      </p:sp>
+    </p:spTree>
+    <p:extLst>
+      <p:ext uri="{BB962C8B-B14F-4D97-AF65-F5344CB8AC3E}">
+        <p14:creationId xmlns:p14="http://schemas.microsoft.com/office/powerpoint/2010/main" val="2047281538"/>
+      </p:ext>
+    </p:extLst>
+  </p:cSld>
+  <p:clrMapOvr>
+    <a:masterClrMapping/>
+  </p:clrMapOvr>
+</p:sld>
+</file>
+
+<file path=ppt/slides/slide14.xml><?xml version="1.0" encoding="utf-8"?>
+<p:sld xmlns:a="http://schemas.openxmlformats.org/drawingml/2006/main" xmlns:r="http://schemas.openxmlformats.org/officeDocument/2006/relationships" xmlns:p="http://schemas.openxmlformats.org/presentationml/2006/main">
+  <p:cSld>
+    <p:spTree>
+      <p:nvGrpSpPr>
+        <p:cNvPr id="1" name=""/>
+        <p:cNvGrpSpPr/>
+        <p:nvPr/>
+      </p:nvGrpSpPr>
+      <p:grpSpPr>
+        <a:xfrm>
+          <a:off x="0" y="0"/>
+          <a:ext cx="0" cy="0"/>
+          <a:chOff x="0" y="0"/>
+          <a:chExt cx="0" cy="0"/>
+        </a:xfrm>
+      </p:grpSpPr>
+      <p:sp>
+        <p:nvSpPr>
+          <p:cNvPr id="2" name="Title 1">
+            <a:extLst>
+              <a:ext uri="{FF2B5EF4-FFF2-40B4-BE49-F238E27FC236}">
+                <a16:creationId xmlns:a16="http://schemas.microsoft.com/office/drawing/2014/main" id="{E483599C-61F4-AD4E-8360-0986B19A35C9}"/>
+              </a:ext>
+            </a:extLst>
+          </p:cNvPr>
+          <p:cNvSpPr>
+            <a:spLocks noGrp="1"/>
+          </p:cNvSpPr>
+          <p:nvPr>
+            <p:ph type="title"/>
+          </p:nvPr>
+        </p:nvSpPr>
+        <p:spPr/>
+        <p:txBody>
+          <a:bodyPr/>
+          <a:lstStyle/>
+          <a:p>
+            <a:pPr algn="ctr"/>
+            <a:r>
+              <a:rPr lang="en-US" dirty="0"/>
+              <a:t>Thanks</a:t>
+            </a:r>
+          </a:p>
+        </p:txBody>
+      </p:sp>
+      <p:sp>
+        <p:nvSpPr>
+          <p:cNvPr id="3" name="Content Placeholder 2">
+            <a:extLst>
+              <a:ext uri="{FF2B5EF4-FFF2-40B4-BE49-F238E27FC236}">
+                <a16:creationId xmlns:a16="http://schemas.microsoft.com/office/drawing/2014/main" id="{8C7C233C-B2C0-794C-900D-CDB1088F9016}"/>
+              </a:ext>
+            </a:extLst>
+          </p:cNvPr>
+          <p:cNvSpPr>
+            <a:spLocks noGrp="1"/>
+          </p:cNvSpPr>
+          <p:nvPr>
+            <p:ph idx="1"/>
+          </p:nvPr>
+        </p:nvSpPr>
+        <p:spPr>
+          <a:xfrm>
+            <a:off x="1371600" y="2571750"/>
+            <a:ext cx="9601200" cy="3295650"/>
+          </a:xfrm>
+        </p:spPr>
+        <p:txBody>
+          <a:bodyPr>
+            <a:normAutofit/>
+          </a:bodyPr>
+          <a:lstStyle/>
+          <a:p>
+            <a:pPr marL="0" indent="0" algn="ctr">
+              <a:buNone/>
+            </a:pPr>
+            <a:r>
+              <a:rPr lang="en-US" sz="2400" dirty="0"/>
+              <a:t>Code available at:</a:t>
+            </a:r>
+          </a:p>
+          <a:p>
+            <a:pPr marL="0" indent="0" algn="ctr">
+              <a:buNone/>
+            </a:pPr>
+            <a:r>
+              <a:rPr lang="en-US" sz="2400" dirty="0"/>
+              <a:t>https://</a:t>
+            </a:r>
+            <a:r>
+              <a:rPr lang="en-US" sz="2400" dirty="0" err="1"/>
+              <a:t>github.com</a:t>
+            </a:r>
+            <a:r>
+              <a:rPr lang="en-US" sz="2400" dirty="0"/>
+              <a:t>/</a:t>
+            </a:r>
+            <a:r>
+              <a:rPr lang="en-US" sz="2400" dirty="0" err="1"/>
+              <a:t>bdelate</a:t>
+            </a:r>
+            <a:r>
+              <a:rPr lang="en-US" sz="2400" dirty="0"/>
+              <a:t>/talk-python-</a:t>
+            </a:r>
+            <a:r>
+              <a:rPr lang="en-US" sz="2400" dirty="0" err="1"/>
+              <a:t>async</a:t>
+            </a:r>
+            <a:endParaRPr lang="en-US" sz="2400" dirty="0"/>
+          </a:p>
+        </p:txBody>
+      </p:sp>
+    </p:spTree>
+    <p:extLst>
+      <p:ext uri="{BB962C8B-B14F-4D97-AF65-F5344CB8AC3E}">
+        <p14:creationId xmlns:p14="http://schemas.microsoft.com/office/powerpoint/2010/main" val="4147561609"/>
+      </p:ext>
+    </p:extLst>
+  </p:cSld>
+  <p:clrMapOvr>
+    <a:masterClrMapping/>
+  </p:clrMapOvr>
+</p:sld>
+</file>
+
 <file path=ppt/slides/slide2.xml><?xml version="1.0" encoding="utf-8"?>
 <p:sld xmlns:a="http://schemas.openxmlformats.org/drawingml/2006/main" xmlns:r="http://schemas.openxmlformats.org/officeDocument/2006/relationships" xmlns:p="http://schemas.openxmlformats.org/presentationml/2006/main">
   <p:cSld>
@@ -3939,8 +6106,8 @@
         </p:nvSpPr>
         <p:spPr>
           <a:xfrm>
-            <a:off x="4643438" y="1865586"/>
-            <a:ext cx="6329362" cy="3581400"/>
+            <a:off x="4729163" y="1865586"/>
+            <a:ext cx="6243637" cy="3581400"/>
           </a:xfrm>
         </p:spPr>
         <p:txBody>
@@ -3950,72 +6117,63 @@
           <a:lstStyle/>
           <a:p>
             <a:r>
-              <a:rPr lang="en-US" sz="1800" dirty="0"/>
+              <a:rPr lang="en-US" dirty="0"/>
               <a:t>CPU vs IO bound operations</a:t>
             </a:r>
           </a:p>
           <a:p>
             <a:r>
-              <a:rPr lang="en-US" sz="1800" dirty="0"/>
+              <a:rPr lang="en-US" dirty="0"/>
               <a:t>Sync vs </a:t>
             </a:r>
             <a:r>
-              <a:rPr lang="en-US" sz="1800" dirty="0" err="1"/>
+              <a:rPr lang="en-US" dirty="0" err="1"/>
               <a:t>Async</a:t>
             </a:r>
-            <a:endParaRPr lang="en-US" sz="1800" dirty="0"/>
-          </a:p>
-          <a:p>
-            <a:r>
-              <a:rPr lang="en-US" sz="1800" dirty="0"/>
+            <a:endParaRPr lang="en-US" dirty="0"/>
+          </a:p>
+          <a:p>
+            <a:r>
+              <a:rPr lang="en-US" dirty="0"/>
               <a:t>Concurrent vs Parallel</a:t>
             </a:r>
           </a:p>
           <a:p>
             <a:r>
-              <a:rPr lang="en-US" sz="1800" dirty="0"/>
+              <a:rPr lang="en-US" dirty="0"/>
               <a:t>The GIL</a:t>
             </a:r>
           </a:p>
           <a:p>
             <a:r>
-              <a:rPr lang="en-US" sz="1800" dirty="0"/>
+              <a:rPr lang="en-US" dirty="0"/>
               <a:t>Threads</a:t>
             </a:r>
           </a:p>
           <a:p>
             <a:r>
-              <a:rPr lang="en-US" sz="1800" dirty="0"/>
+              <a:rPr lang="en-US" dirty="0"/>
               <a:t>Processes</a:t>
             </a:r>
           </a:p>
           <a:p>
             <a:r>
-              <a:rPr lang="en-US" sz="1800" dirty="0" err="1"/>
+              <a:rPr lang="en-US" dirty="0" err="1"/>
               <a:t>Asyncio</a:t>
             </a:r>
-            <a:endParaRPr lang="en-US" sz="1800" dirty="0"/>
-          </a:p>
-          <a:p>
-            <a:r>
-              <a:rPr lang="en-US" sz="1800" dirty="0"/>
-              <a:t>When to use what</a:t>
-            </a:r>
-          </a:p>
-          <a:p>
-            <a:r>
-              <a:rPr lang="en-US" sz="1800" dirty="0"/>
+            <a:endParaRPr lang="en-US" dirty="0"/>
+          </a:p>
+          <a:p>
+            <a:r>
+              <a:rPr lang="en-US" dirty="0"/>
+              <a:t>Use cases</a:t>
+            </a:r>
+          </a:p>
+          <a:p>
+            <a:r>
+              <a:rPr lang="en-US" dirty="0"/>
               <a:t>Demo</a:t>
             </a:r>
-          </a:p>
-          <a:p>
-            <a:r>
-              <a:rPr lang="en-US" sz="1800" dirty="0"/>
-              <a:t>Where to from here</a:t>
-            </a:r>
-          </a:p>
-          <a:p>
-            <a:endParaRPr lang="en-US" sz="1800" dirty="0"/>
           </a:p>
         </p:txBody>
       </p:sp>
@@ -5574,6 +7732,556 @@
 </p:sld>
 </file>
 
+<file path=ppt/slides/slide6.xml><?xml version="1.0" encoding="utf-8"?>
+<p:sld xmlns:a="http://schemas.openxmlformats.org/drawingml/2006/main" xmlns:r="http://schemas.openxmlformats.org/officeDocument/2006/relationships" xmlns:p="http://schemas.openxmlformats.org/presentationml/2006/main">
+  <p:cSld>
+    <p:spTree>
+      <p:nvGrpSpPr>
+        <p:cNvPr id="1" name=""/>
+        <p:cNvGrpSpPr/>
+        <p:nvPr/>
+      </p:nvGrpSpPr>
+      <p:grpSpPr>
+        <a:xfrm>
+          <a:off x="0" y="0"/>
+          <a:ext cx="0" cy="0"/>
+          <a:chOff x="0" y="0"/>
+          <a:chExt cx="0" cy="0"/>
+        </a:xfrm>
+      </p:grpSpPr>
+      <p:sp>
+        <p:nvSpPr>
+          <p:cNvPr id="2" name="Title 1">
+            <a:extLst>
+              <a:ext uri="{FF2B5EF4-FFF2-40B4-BE49-F238E27FC236}">
+                <a16:creationId xmlns:a16="http://schemas.microsoft.com/office/drawing/2014/main" id="{C0293B16-396B-F841-A995-8088692F84B6}"/>
+              </a:ext>
+            </a:extLst>
+          </p:cNvPr>
+          <p:cNvSpPr>
+            <a:spLocks noGrp="1"/>
+          </p:cNvSpPr>
+          <p:nvPr>
+            <p:ph type="title"/>
+          </p:nvPr>
+        </p:nvSpPr>
+        <p:spPr>
+          <a:xfrm>
+            <a:off x="1371600" y="685800"/>
+            <a:ext cx="9601200" cy="1485900"/>
+          </a:xfrm>
+        </p:spPr>
+        <p:txBody>
+          <a:bodyPr/>
+          <a:lstStyle/>
+          <a:p>
+            <a:pPr algn="ctr"/>
+            <a:r>
+              <a:rPr lang="en-US" dirty="0"/>
+              <a:t>The GIL</a:t>
+            </a:r>
+          </a:p>
+        </p:txBody>
+      </p:sp>
+      <p:sp>
+        <p:nvSpPr>
+          <p:cNvPr id="3" name="Content Placeholder 2">
+            <a:extLst>
+              <a:ext uri="{FF2B5EF4-FFF2-40B4-BE49-F238E27FC236}">
+                <a16:creationId xmlns:a16="http://schemas.microsoft.com/office/drawing/2014/main" id="{7393841D-FAB5-2542-AC21-1606060148E9}"/>
+              </a:ext>
+            </a:extLst>
+          </p:cNvPr>
+          <p:cNvSpPr>
+            <a:spLocks noGrp="1"/>
+          </p:cNvSpPr>
+          <p:nvPr>
+            <p:ph idx="1"/>
+          </p:nvPr>
+        </p:nvSpPr>
+        <p:spPr>
+          <a:xfrm>
+            <a:off x="1371600" y="2171700"/>
+            <a:ext cx="9601200" cy="3608990"/>
+          </a:xfrm>
+        </p:spPr>
+        <p:txBody>
+          <a:bodyPr>
+            <a:normAutofit/>
+          </a:bodyPr>
+          <a:lstStyle/>
+          <a:p>
+            <a:r>
+              <a:rPr lang="en-US" dirty="0"/>
+              <a:t>Global Interpreter Lock</a:t>
+            </a:r>
+          </a:p>
+          <a:p>
+            <a:r>
+              <a:rPr lang="en-ZA" dirty="0"/>
+              <a:t>A lock that ensures only one thread can execute at a time</a:t>
+            </a:r>
+          </a:p>
+          <a:p>
+            <a:r>
+              <a:rPr lang="en-ZA" dirty="0"/>
+              <a:t>Applicable to </a:t>
+            </a:r>
+            <a:r>
+              <a:rPr lang="en-ZA" dirty="0" err="1"/>
+              <a:t>CPython</a:t>
+            </a:r>
+            <a:r>
+              <a:rPr lang="en-ZA" dirty="0"/>
+              <a:t>. Not </a:t>
+            </a:r>
+            <a:r>
+              <a:rPr lang="en-ZA" dirty="0" err="1"/>
+              <a:t>Jython</a:t>
+            </a:r>
+            <a:r>
+              <a:rPr lang="en-ZA" dirty="0"/>
+              <a:t>, </a:t>
+            </a:r>
+            <a:r>
+              <a:rPr lang="en-ZA" dirty="0" err="1"/>
+              <a:t>IronPython</a:t>
+            </a:r>
+            <a:r>
+              <a:rPr lang="en-ZA" dirty="0"/>
+              <a:t>.</a:t>
+            </a:r>
+          </a:p>
+          <a:p>
+            <a:r>
+              <a:rPr lang="en-ZA" dirty="0"/>
+              <a:t>Can be a potential performance bottleneck</a:t>
+            </a:r>
+          </a:p>
+          <a:p>
+            <a:r>
+              <a:rPr lang="en-ZA" dirty="0"/>
+              <a:t>The GIL is released:</a:t>
+            </a:r>
+          </a:p>
+          <a:p>
+            <a:pPr lvl="1"/>
+            <a:r>
+              <a:rPr lang="en-ZA" dirty="0"/>
+              <a:t>IO</a:t>
+            </a:r>
+          </a:p>
+          <a:p>
+            <a:pPr lvl="1"/>
+            <a:r>
+              <a:rPr lang="en-ZA" dirty="0"/>
+              <a:t>Every 0.005 seconds. Can be changed using </a:t>
+            </a:r>
+            <a:r>
+              <a:rPr lang="en-ZA" dirty="0" err="1"/>
+              <a:t>sys.setswitchinterval</a:t>
+            </a:r>
+            <a:r>
+              <a:rPr lang="en-ZA" dirty="0"/>
+              <a:t>()</a:t>
+            </a:r>
+          </a:p>
+          <a:p>
+            <a:pPr lvl="1"/>
+            <a:endParaRPr lang="en-ZA" dirty="0"/>
+          </a:p>
+          <a:p>
+            <a:endParaRPr lang="en-US" dirty="0"/>
+          </a:p>
+        </p:txBody>
+      </p:sp>
+    </p:spTree>
+    <p:extLst>
+      <p:ext uri="{BB962C8B-B14F-4D97-AF65-F5344CB8AC3E}">
+        <p14:creationId xmlns:p14="http://schemas.microsoft.com/office/powerpoint/2010/main" val="3011819278"/>
+      </p:ext>
+    </p:extLst>
+  </p:cSld>
+  <p:clrMapOvr>
+    <a:masterClrMapping/>
+  </p:clrMapOvr>
+</p:sld>
+</file>
+
+<file path=ppt/slides/slide7.xml><?xml version="1.0" encoding="utf-8"?>
+<p:sld xmlns:a="http://schemas.openxmlformats.org/drawingml/2006/main" xmlns:r="http://schemas.openxmlformats.org/officeDocument/2006/relationships" xmlns:p="http://schemas.openxmlformats.org/presentationml/2006/main">
+  <p:cSld>
+    <p:spTree>
+      <p:nvGrpSpPr>
+        <p:cNvPr id="1" name=""/>
+        <p:cNvGrpSpPr/>
+        <p:nvPr/>
+      </p:nvGrpSpPr>
+      <p:grpSpPr>
+        <a:xfrm>
+          <a:off x="0" y="0"/>
+          <a:ext cx="0" cy="0"/>
+          <a:chOff x="0" y="0"/>
+          <a:chExt cx="0" cy="0"/>
+        </a:xfrm>
+      </p:grpSpPr>
+      <p:sp>
+        <p:nvSpPr>
+          <p:cNvPr id="2" name="Title 1">
+            <a:extLst>
+              <a:ext uri="{FF2B5EF4-FFF2-40B4-BE49-F238E27FC236}">
+                <a16:creationId xmlns:a16="http://schemas.microsoft.com/office/drawing/2014/main" id="{22144852-C50F-F445-B5D5-93D02D77D8EB}"/>
+              </a:ext>
+            </a:extLst>
+          </p:cNvPr>
+          <p:cNvSpPr>
+            <a:spLocks noGrp="1"/>
+          </p:cNvSpPr>
+          <p:nvPr>
+            <p:ph type="title"/>
+          </p:nvPr>
+        </p:nvSpPr>
+        <p:spPr/>
+        <p:txBody>
+          <a:bodyPr/>
+          <a:lstStyle/>
+          <a:p>
+            <a:pPr algn="ctr"/>
+            <a:r>
+              <a:rPr lang="en-US" dirty="0"/>
+              <a:t>Why does the GIL exist?</a:t>
+            </a:r>
+          </a:p>
+        </p:txBody>
+      </p:sp>
+      <p:sp>
+        <p:nvSpPr>
+          <p:cNvPr id="3" name="Content Placeholder 2">
+            <a:extLst>
+              <a:ext uri="{FF2B5EF4-FFF2-40B4-BE49-F238E27FC236}">
+                <a16:creationId xmlns:a16="http://schemas.microsoft.com/office/drawing/2014/main" id="{E5C43208-241E-434F-8FE0-AC29EABD20DA}"/>
+              </a:ext>
+            </a:extLst>
+          </p:cNvPr>
+          <p:cNvSpPr>
+            <a:spLocks noGrp="1"/>
+          </p:cNvSpPr>
+          <p:nvPr>
+            <p:ph idx="1"/>
+          </p:nvPr>
+        </p:nvSpPr>
+        <p:spPr/>
+        <p:txBody>
+          <a:bodyPr/>
+          <a:lstStyle/>
+          <a:p>
+            <a:r>
+              <a:rPr lang="en-ZA" dirty="0"/>
+              <a:t>Python uses reference counting for garbage collection</a:t>
+            </a:r>
+          </a:p>
+          <a:p>
+            <a:r>
+              <a:rPr lang="en-ZA" dirty="0"/>
+              <a:t>When no references point to an object, the memory is released</a:t>
+            </a:r>
+          </a:p>
+          <a:p>
+            <a:r>
+              <a:rPr lang="en-US" dirty="0"/>
+              <a:t>Without the GIL multiple threads could simultaneously increment / decrement an objects reference count resulting in:</a:t>
+            </a:r>
+          </a:p>
+          <a:p>
+            <a:pPr lvl="1"/>
+            <a:r>
+              <a:rPr lang="en-US" dirty="0"/>
+              <a:t>Deadlocks</a:t>
+            </a:r>
+          </a:p>
+          <a:p>
+            <a:pPr lvl="1"/>
+            <a:r>
+              <a:rPr lang="en-US" dirty="0"/>
+              <a:t>Releasing an objects memory while it’s still needed</a:t>
+            </a:r>
+          </a:p>
+          <a:p>
+            <a:pPr lvl="1"/>
+            <a:endParaRPr lang="en-US" dirty="0"/>
+          </a:p>
+        </p:txBody>
+      </p:sp>
+    </p:spTree>
+    <p:extLst>
+      <p:ext uri="{BB962C8B-B14F-4D97-AF65-F5344CB8AC3E}">
+        <p14:creationId xmlns:p14="http://schemas.microsoft.com/office/powerpoint/2010/main" val="2218101044"/>
+      </p:ext>
+    </p:extLst>
+  </p:cSld>
+  <p:clrMapOvr>
+    <a:masterClrMapping/>
+  </p:clrMapOvr>
+</p:sld>
+</file>
+
+<file path=ppt/slides/slide8.xml><?xml version="1.0" encoding="utf-8"?>
+<p:sld xmlns:a="http://schemas.openxmlformats.org/drawingml/2006/main" xmlns:r="http://schemas.openxmlformats.org/officeDocument/2006/relationships" xmlns:p="http://schemas.openxmlformats.org/presentationml/2006/main">
+  <p:cSld>
+    <p:spTree>
+      <p:nvGrpSpPr>
+        <p:cNvPr id="1" name=""/>
+        <p:cNvGrpSpPr/>
+        <p:nvPr/>
+      </p:nvGrpSpPr>
+      <p:grpSpPr>
+        <a:xfrm>
+          <a:off x="0" y="0"/>
+          <a:ext cx="0" cy="0"/>
+          <a:chOff x="0" y="0"/>
+          <a:chExt cx="0" cy="0"/>
+        </a:xfrm>
+      </p:grpSpPr>
+      <p:sp>
+        <p:nvSpPr>
+          <p:cNvPr id="2" name="Title 1">
+            <a:extLst>
+              <a:ext uri="{FF2B5EF4-FFF2-40B4-BE49-F238E27FC236}">
+                <a16:creationId xmlns:a16="http://schemas.microsoft.com/office/drawing/2014/main" id="{917FE55E-4CFD-5646-87E7-147498319C92}"/>
+              </a:ext>
+            </a:extLst>
+          </p:cNvPr>
+          <p:cNvSpPr>
+            <a:spLocks noGrp="1"/>
+          </p:cNvSpPr>
+          <p:nvPr>
+            <p:ph type="title"/>
+          </p:nvPr>
+        </p:nvSpPr>
+        <p:spPr/>
+        <p:txBody>
+          <a:bodyPr/>
+          <a:lstStyle/>
+          <a:p>
+            <a:pPr algn="ctr"/>
+            <a:r>
+              <a:rPr lang="en-US" dirty="0"/>
+              <a:t>Threads</a:t>
+            </a:r>
+          </a:p>
+        </p:txBody>
+      </p:sp>
+      <p:sp>
+        <p:nvSpPr>
+          <p:cNvPr id="3" name="Content Placeholder 2">
+            <a:extLst>
+              <a:ext uri="{FF2B5EF4-FFF2-40B4-BE49-F238E27FC236}">
+                <a16:creationId xmlns:a16="http://schemas.microsoft.com/office/drawing/2014/main" id="{0BFCF295-6D47-4944-BED1-97ED490F30D3}"/>
+              </a:ext>
+            </a:extLst>
+          </p:cNvPr>
+          <p:cNvSpPr>
+            <a:spLocks noGrp="1"/>
+          </p:cNvSpPr>
+          <p:nvPr>
+            <p:ph idx="1"/>
+          </p:nvPr>
+        </p:nvSpPr>
+        <p:spPr/>
+        <p:txBody>
+          <a:bodyPr/>
+          <a:lstStyle/>
+          <a:p>
+            <a:r>
+              <a:rPr lang="en-ZA" dirty="0"/>
+              <a:t>Threads live inside processes and share the same memory space</a:t>
+            </a:r>
+          </a:p>
+          <a:p>
+            <a:r>
+              <a:rPr lang="en-ZA" dirty="0"/>
+              <a:t>They cannot execute code simultaneously</a:t>
+            </a:r>
+          </a:p>
+          <a:p>
+            <a:pPr lvl="1"/>
+            <a:r>
+              <a:rPr lang="en-ZA" dirty="0"/>
+              <a:t>They get things done concurrently</a:t>
+            </a:r>
+          </a:p>
+          <a:p>
+            <a:r>
+              <a:rPr lang="en-ZA" dirty="0"/>
+              <a:t>Threads switch even if they don’t need to</a:t>
+            </a:r>
+          </a:p>
+          <a:p>
+            <a:r>
+              <a:rPr lang="en-ZA" dirty="0"/>
+              <a:t>Can be hard to reason about:</a:t>
+            </a:r>
+          </a:p>
+          <a:p>
+            <a:pPr lvl="1"/>
+            <a:r>
+              <a:rPr lang="en-ZA" dirty="0"/>
+              <a:t>Threads can switch control at any time</a:t>
+            </a:r>
+          </a:p>
+          <a:p>
+            <a:pPr lvl="1"/>
+            <a:r>
+              <a:rPr lang="en-ZA" dirty="0"/>
+              <a:t>Code must be thread safe</a:t>
+            </a:r>
+          </a:p>
+          <a:p>
+            <a:pPr lvl="1"/>
+            <a:r>
+              <a:rPr lang="en-ZA" dirty="0"/>
+              <a:t>Locks are needed when accessing shared memory</a:t>
+            </a:r>
+          </a:p>
+          <a:p>
+            <a:pPr lvl="1"/>
+            <a:endParaRPr lang="en-ZA" dirty="0"/>
+          </a:p>
+          <a:p>
+            <a:endParaRPr lang="en-ZA" dirty="0"/>
+          </a:p>
+          <a:p>
+            <a:endParaRPr lang="en-US" dirty="0"/>
+          </a:p>
+        </p:txBody>
+      </p:sp>
+    </p:spTree>
+    <p:extLst>
+      <p:ext uri="{BB962C8B-B14F-4D97-AF65-F5344CB8AC3E}">
+        <p14:creationId xmlns:p14="http://schemas.microsoft.com/office/powerpoint/2010/main" val="2326595732"/>
+      </p:ext>
+    </p:extLst>
+  </p:cSld>
+  <p:clrMapOvr>
+    <a:masterClrMapping/>
+  </p:clrMapOvr>
+</p:sld>
+</file>
+
+<file path=ppt/slides/slide9.xml><?xml version="1.0" encoding="utf-8"?>
+<p:sld xmlns:a="http://schemas.openxmlformats.org/drawingml/2006/main" xmlns:r="http://schemas.openxmlformats.org/officeDocument/2006/relationships" xmlns:p="http://schemas.openxmlformats.org/presentationml/2006/main">
+  <p:cSld>
+    <p:spTree>
+      <p:nvGrpSpPr>
+        <p:cNvPr id="1" name=""/>
+        <p:cNvGrpSpPr/>
+        <p:nvPr/>
+      </p:nvGrpSpPr>
+      <p:grpSpPr>
+        <a:xfrm>
+          <a:off x="0" y="0"/>
+          <a:ext cx="0" cy="0"/>
+          <a:chOff x="0" y="0"/>
+          <a:chExt cx="0" cy="0"/>
+        </a:xfrm>
+      </p:grpSpPr>
+      <p:sp>
+        <p:nvSpPr>
+          <p:cNvPr id="2" name="Title 1">
+            <a:extLst>
+              <a:ext uri="{FF2B5EF4-FFF2-40B4-BE49-F238E27FC236}">
+                <a16:creationId xmlns:a16="http://schemas.microsoft.com/office/drawing/2014/main" id="{8C72C5B7-F948-0E43-B3ED-1090E58536E4}"/>
+              </a:ext>
+            </a:extLst>
+          </p:cNvPr>
+          <p:cNvSpPr>
+            <a:spLocks noGrp="1"/>
+          </p:cNvSpPr>
+          <p:nvPr>
+            <p:ph type="title"/>
+          </p:nvPr>
+        </p:nvSpPr>
+        <p:spPr/>
+        <p:txBody>
+          <a:bodyPr/>
+          <a:lstStyle/>
+          <a:p>
+            <a:pPr algn="ctr"/>
+            <a:r>
+              <a:rPr lang="en-US" dirty="0"/>
+              <a:t>Processes</a:t>
+            </a:r>
+          </a:p>
+        </p:txBody>
+      </p:sp>
+      <p:sp>
+        <p:nvSpPr>
+          <p:cNvPr id="3" name="Content Placeholder 2">
+            <a:extLst>
+              <a:ext uri="{FF2B5EF4-FFF2-40B4-BE49-F238E27FC236}">
+                <a16:creationId xmlns:a16="http://schemas.microsoft.com/office/drawing/2014/main" id="{F064E1BE-B366-224E-A304-15B7FBDEF748}"/>
+              </a:ext>
+            </a:extLst>
+          </p:cNvPr>
+          <p:cNvSpPr>
+            <a:spLocks noGrp="1"/>
+          </p:cNvSpPr>
+          <p:nvPr>
+            <p:ph idx="1"/>
+          </p:nvPr>
+        </p:nvSpPr>
+        <p:spPr/>
+        <p:txBody>
+          <a:bodyPr/>
+          <a:lstStyle/>
+          <a:p>
+            <a:r>
+              <a:rPr lang="en-US" dirty="0"/>
+              <a:t>Separate memory space.</a:t>
+            </a:r>
+          </a:p>
+          <a:p>
+            <a:r>
+              <a:rPr lang="en-US" dirty="0"/>
+              <a:t>Execute code in parallel.</a:t>
+            </a:r>
+          </a:p>
+          <a:p>
+            <a:r>
+              <a:rPr lang="en-ZA" dirty="0"/>
+              <a:t>Costly to spawn. More overhead than threads.</a:t>
+            </a:r>
+          </a:p>
+          <a:p>
+            <a:r>
+              <a:rPr lang="en-ZA" dirty="0"/>
+              <a:t>Sharing information between processes is done by pickling.</a:t>
+            </a:r>
+          </a:p>
+          <a:p>
+            <a:endParaRPr lang="en-ZA" dirty="0"/>
+          </a:p>
+          <a:p>
+            <a:endParaRPr lang="en-ZA" dirty="0"/>
+          </a:p>
+          <a:p>
+            <a:endParaRPr lang="en-US" dirty="0"/>
+          </a:p>
+        </p:txBody>
+      </p:sp>
+    </p:spTree>
+    <p:extLst>
+      <p:ext uri="{BB962C8B-B14F-4D97-AF65-F5344CB8AC3E}">
+        <p14:creationId xmlns:p14="http://schemas.microsoft.com/office/powerpoint/2010/main" val="781488899"/>
+      </p:ext>
+    </p:extLst>
+  </p:cSld>
+  <p:clrMapOvr>
+    <a:masterClrMapping/>
+  </p:clrMapOvr>
+</p:sld>
+</file>
+
 <file path=ppt/theme/theme1.xml><?xml version="1.0" encoding="utf-8"?>
 <a:theme xmlns:a="http://schemas.openxmlformats.org/drawingml/2006/main" name="Crop">
   <a:themeElements>

</xml_diff>

<commit_message>
Update Readme and slides.
</commit_message>
<xml_diff>
--- a/slides.pptx
+++ b/slides.pptx
@@ -306,7 +306,7 @@
             <a:fld id="{87DE6118-2437-4B30-8E3C-4D2BE6020583}" type="datetimeFigureOut">
               <a:rPr lang="en-US" dirty="0"/>
               <a:pPr/>
-              <a:t>11/24/18</a:t>
+              <a:t>11/28/18</a:t>
             </a:fld>
             <a:endParaRPr lang="en-US" dirty="0"/>
           </a:p>
@@ -632,7 +632,7 @@
           <a:p>
             <a:fld id="{87DE6118-2437-4B30-8E3C-4D2BE6020583}" type="datetimeFigureOut">
               <a:rPr lang="en-US" dirty="0"/>
-              <a:t>11/24/18</a:t>
+              <a:t>11/28/18</a:t>
             </a:fld>
             <a:endParaRPr lang="en-US" dirty="0"/>
           </a:p>
@@ -807,7 +807,7 @@
           <a:p>
             <a:fld id="{87DE6118-2437-4B30-8E3C-4D2BE6020583}" type="datetimeFigureOut">
               <a:rPr lang="en-US" dirty="0"/>
-              <a:t>11/24/18</a:t>
+              <a:t>11/28/18</a:t>
             </a:fld>
             <a:endParaRPr lang="en-US" dirty="0"/>
           </a:p>
@@ -972,7 +972,7 @@
           <a:p>
             <a:fld id="{87DE6118-2437-4B30-8E3C-4D2BE6020583}" type="datetimeFigureOut">
               <a:rPr lang="en-US" dirty="0"/>
-              <a:t>11/24/18</a:t>
+              <a:t>11/28/18</a:t>
             </a:fld>
             <a:endParaRPr lang="en-US" dirty="0"/>
           </a:p>
@@ -1245,7 +1245,7 @@
             <a:fld id="{87DE6118-2437-4B30-8E3C-4D2BE6020583}" type="datetimeFigureOut">
               <a:rPr lang="en-US" dirty="0"/>
               <a:pPr/>
-              <a:t>11/24/18</a:t>
+              <a:t>11/28/18</a:t>
             </a:fld>
             <a:endParaRPr lang="en-US" dirty="0"/>
           </a:p>
@@ -1635,7 +1635,7 @@
           <a:p>
             <a:fld id="{87DE6118-2437-4B30-8E3C-4D2BE6020583}" type="datetimeFigureOut">
               <a:rPr lang="en-US" dirty="0"/>
-              <a:t>11/24/18</a:t>
+              <a:t>11/28/18</a:t>
             </a:fld>
             <a:endParaRPr lang="en-US" dirty="0"/>
           </a:p>
@@ -2107,7 +2107,7 @@
           <a:p>
             <a:fld id="{87DE6118-2437-4B30-8E3C-4D2BE6020583}" type="datetimeFigureOut">
               <a:rPr lang="en-US" dirty="0"/>
-              <a:t>11/24/18</a:t>
+              <a:t>11/28/18</a:t>
             </a:fld>
             <a:endParaRPr lang="en-US" dirty="0"/>
           </a:p>
@@ -2220,7 +2220,7 @@
           <a:p>
             <a:fld id="{87DE6118-2437-4B30-8E3C-4D2BE6020583}" type="datetimeFigureOut">
               <a:rPr lang="en-US" dirty="0"/>
-              <a:t>11/24/18</a:t>
+              <a:t>11/28/18</a:t>
             </a:fld>
             <a:endParaRPr lang="en-US" dirty="0"/>
           </a:p>
@@ -2310,7 +2310,7 @@
           <a:p>
             <a:fld id="{87DE6118-2437-4B30-8E3C-4D2BE6020583}" type="datetimeFigureOut">
               <a:rPr lang="en-US" dirty="0"/>
-              <a:t>11/24/18</a:t>
+              <a:t>11/28/18</a:t>
             </a:fld>
             <a:endParaRPr lang="en-US" dirty="0"/>
           </a:p>
@@ -2652,7 +2652,7 @@
             <a:fld id="{87DE6118-2437-4B30-8E3C-4D2BE6020583}" type="datetimeFigureOut">
               <a:rPr lang="en-US" dirty="0"/>
               <a:pPr/>
-              <a:t>11/24/18</a:t>
+              <a:t>11/28/18</a:t>
             </a:fld>
             <a:endParaRPr lang="en-US" dirty="0"/>
           </a:p>
@@ -3037,7 +3037,7 @@
             <a:fld id="{87DE6118-2437-4B30-8E3C-4D2BE6020583}" type="datetimeFigureOut">
               <a:rPr lang="en-US" dirty="0"/>
               <a:pPr/>
-              <a:t>11/24/18</a:t>
+              <a:t>11/28/18</a:t>
             </a:fld>
             <a:endParaRPr lang="en-US" dirty="0"/>
           </a:p>
@@ -3312,7 +3312,7 @@
             <a:fld id="{87DE6118-2437-4B30-8E3C-4D2BE6020583}" type="datetimeFigureOut">
               <a:rPr lang="en-US" dirty="0"/>
               <a:pPr/>
-              <a:t>11/24/18</a:t>
+              <a:t>11/28/18</a:t>
             </a:fld>
             <a:endParaRPr lang="en-US" dirty="0"/>
           </a:p>
@@ -4967,7 +4967,38 @@
             <a:pPr lvl="1"/>
             <a:r>
               <a:rPr lang="en-US" dirty="0"/>
-              <a:t>Functions are changed to coroutines where required</a:t>
+              <a:t>Functions are changed to coroutines where required (</a:t>
+            </a:r>
+            <a:r>
+              <a:rPr lang="en-US" dirty="0" err="1"/>
+              <a:t>async</a:t>
+            </a:r>
+            <a:r>
+              <a:rPr lang="en-US" dirty="0"/>
+              <a:t> def)</a:t>
+            </a:r>
+            <a:endParaRPr lang="en-US" i="1" dirty="0"/>
+          </a:p>
+          <a:p>
+            <a:pPr lvl="1"/>
+            <a:r>
+              <a:rPr lang="en-US" dirty="0"/>
+              <a:t>Create tasks from the coroutines and add them to the event loop</a:t>
+            </a:r>
+          </a:p>
+          <a:p>
+            <a:pPr lvl="1"/>
+            <a:r>
+              <a:rPr lang="en-US" i="1" dirty="0"/>
+              <a:t>We </a:t>
+            </a:r>
+            <a:r>
+              <a:rPr lang="en-US" dirty="0"/>
+              <a:t>await</a:t>
+            </a:r>
+            <a:r>
+              <a:rPr lang="en-US" i="1" dirty="0"/>
+              <a:t> a coroutine which yields control back to the event loop</a:t>
             </a:r>
           </a:p>
           <a:p>
@@ -5021,51 +5052,25 @@
             <a:pPr lvl="3"/>
             <a:r>
               <a:rPr lang="en-US" dirty="0"/>
-              <a:t>a</a:t>
-            </a:r>
-            <a:r>
-              <a:rPr lang="en-US" i="1" dirty="0"/>
-              <a:t>wait </a:t>
-            </a:r>
-            <a:r>
-              <a:rPr lang="en-US" i="1" dirty="0" err="1"/>
+              <a:t>await </a:t>
+            </a:r>
+            <a:r>
+              <a:rPr lang="en-US" dirty="0" err="1"/>
               <a:t>ThreadPoolExecutor</a:t>
             </a:r>
+            <a:endParaRPr lang="en-US" dirty="0"/>
+          </a:p>
+          <a:p>
+            <a:pPr lvl="3"/>
+            <a:r>
+              <a:rPr lang="en-US" dirty="0"/>
+              <a:t>await </a:t>
+            </a:r>
+            <a:r>
+              <a:rPr lang="en-US" dirty="0" err="1"/>
+              <a:t>ProcessPoolExecutor</a:t>
+            </a:r>
             <a:endParaRPr lang="en-US" i="1" dirty="0"/>
-          </a:p>
-          <a:p>
-            <a:pPr lvl="3"/>
-            <a:r>
-              <a:rPr lang="en-US" dirty="0"/>
-              <a:t>a</a:t>
-            </a:r>
-            <a:r>
-              <a:rPr lang="en-US" i="1" dirty="0"/>
-              <a:t>wait </a:t>
-            </a:r>
-            <a:r>
-              <a:rPr lang="en-US" i="1" dirty="0" err="1"/>
-              <a:t>ProcessPoolExecutor</a:t>
-            </a:r>
-            <a:endParaRPr lang="en-US" i="1" dirty="0"/>
-          </a:p>
-          <a:p>
-            <a:pPr lvl="3"/>
-            <a:endParaRPr lang="en-US" i="1" dirty="0"/>
-          </a:p>
-          <a:p>
-            <a:pPr lvl="1"/>
-            <a:r>
-              <a:rPr lang="en-US" dirty="0"/>
-              <a:t>Create tasks from the coroutines and add them to the event loop</a:t>
-            </a:r>
-          </a:p>
-          <a:p>
-            <a:pPr lvl="1"/>
-            <a:r>
-              <a:rPr lang="en-US" i="1" dirty="0"/>
-              <a:t>We can await a coroutine which yields control back to the event loop</a:t>
-            </a:r>
           </a:p>
           <a:p>
             <a:pPr lvl="1"/>
@@ -5306,39 +5311,26 @@
                                   </p:childTnLst>
                                 </p:cTn>
                               </p:par>
+                            </p:childTnLst>
+                          </p:cTn>
+                        </p:par>
+                      </p:childTnLst>
+                    </p:cTn>
+                  </p:par>
+                  <p:par>
+                    <p:cTn id="19" fill="hold">
+                      <p:stCondLst>
+                        <p:cond delay="indefinite"/>
+                      </p:stCondLst>
+                      <p:childTnLst>
+                        <p:par>
+                          <p:cTn id="20" fill="hold">
+                            <p:stCondLst>
+                              <p:cond delay="0"/>
+                            </p:stCondLst>
+                            <p:childTnLst>
                               <p:par>
-                                <p:cTn id="19" presetID="1" presetClass="entr" presetSubtype="0" fill="hold" grpId="0" nodeType="withEffect">
-                                  <p:stCondLst>
-                                    <p:cond delay="0"/>
-                                  </p:stCondLst>
-                                  <p:childTnLst>
-                                    <p:set>
-                                      <p:cBhvr>
-                                        <p:cTn id="20" dur="1" fill="hold">
-                                          <p:stCondLst>
-                                            <p:cond delay="0"/>
-                                          </p:stCondLst>
-                                        </p:cTn>
-                                        <p:tgtEl>
-                                          <p:spTgt spid="3">
-                                            <p:txEl>
-                                              <p:pRg st="4" end="4"/>
-                                            </p:txEl>
-                                          </p:spTgt>
-                                        </p:tgtEl>
-                                        <p:attrNameLst>
-                                          <p:attrName>style.visibility</p:attrName>
-                                        </p:attrNameLst>
-                                      </p:cBhvr>
-                                      <p:to>
-                                        <p:strVal val="visible"/>
-                                      </p:to>
-                                    </p:set>
-                                  </p:childTnLst>
-                                </p:cTn>
-                              </p:par>
-                              <p:par>
-                                <p:cTn id="21" presetID="1" presetClass="entr" presetSubtype="0" fill="hold" grpId="0" nodeType="withEffect">
+                                <p:cTn id="21" presetID="1" presetClass="entr" presetSubtype="0" fill="hold" grpId="0" nodeType="clickEffect">
                                   <p:stCondLst>
                                     <p:cond delay="0"/>
                                   </p:stCondLst>
@@ -5353,7 +5345,7 @@
                                         <p:tgtEl>
                                           <p:spTgt spid="3">
                                             <p:txEl>
-                                              <p:pRg st="5" end="5"/>
+                                              <p:pRg st="4" end="4"/>
                                             </p:txEl>
                                           </p:spTgt>
                                         </p:tgtEl>
@@ -5384,6 +5376,37 @@
                                         <p:tgtEl>
                                           <p:spTgt spid="3">
                                             <p:txEl>
+                                              <p:pRg st="5" end="5"/>
+                                            </p:txEl>
+                                          </p:spTgt>
+                                        </p:tgtEl>
+                                        <p:attrNameLst>
+                                          <p:attrName>style.visibility</p:attrName>
+                                        </p:attrNameLst>
+                                      </p:cBhvr>
+                                      <p:to>
+                                        <p:strVal val="visible"/>
+                                      </p:to>
+                                    </p:set>
+                                  </p:childTnLst>
+                                </p:cTn>
+                              </p:par>
+                              <p:par>
+                                <p:cTn id="25" presetID="1" presetClass="entr" presetSubtype="0" fill="hold" grpId="0" nodeType="withEffect">
+                                  <p:stCondLst>
+                                    <p:cond delay="0"/>
+                                  </p:stCondLst>
+                                  <p:childTnLst>
+                                    <p:set>
+                                      <p:cBhvr>
+                                        <p:cTn id="26" dur="1" fill="hold">
+                                          <p:stCondLst>
+                                            <p:cond delay="0"/>
+                                          </p:stCondLst>
+                                        </p:cTn>
+                                        <p:tgtEl>
+                                          <p:spTgt spid="3">
+                                            <p:txEl>
                                               <p:pRg st="6" end="6"/>
                                             </p:txEl>
                                           </p:spTgt>
@@ -5399,26 +5422,8 @@
                                   </p:childTnLst>
                                 </p:cTn>
                               </p:par>
-                            </p:childTnLst>
-                          </p:cTn>
-                        </p:par>
-                      </p:childTnLst>
-                    </p:cTn>
-                  </p:par>
-                  <p:par>
-                    <p:cTn id="25" fill="hold">
-                      <p:stCondLst>
-                        <p:cond delay="indefinite"/>
-                      </p:stCondLst>
-                      <p:childTnLst>
-                        <p:par>
-                          <p:cTn id="26" fill="hold">
-                            <p:stCondLst>
-                              <p:cond delay="0"/>
-                            </p:stCondLst>
-                            <p:childTnLst>
                               <p:par>
-                                <p:cTn id="27" presetID="1" presetClass="entr" presetSubtype="0" fill="hold" grpId="0" nodeType="clickEffect">
+                                <p:cTn id="27" presetID="1" presetClass="entr" presetSubtype="0" fill="hold" grpId="0" nodeType="withEffect">
                                   <p:stCondLst>
                                     <p:cond delay="0"/>
                                   </p:stCondLst>
@@ -5510,26 +5515,39 @@
                                   </p:childTnLst>
                                 </p:cTn>
                               </p:par>
-                            </p:childTnLst>
-                          </p:cTn>
-                        </p:par>
-                      </p:childTnLst>
-                    </p:cTn>
-                  </p:par>
-                  <p:par>
-                    <p:cTn id="33" fill="hold">
-                      <p:stCondLst>
-                        <p:cond delay="indefinite"/>
-                      </p:stCondLst>
-                      <p:childTnLst>
-                        <p:par>
-                          <p:cTn id="34" fill="hold">
-                            <p:stCondLst>
-                              <p:cond delay="0"/>
-                            </p:stCondLst>
-                            <p:childTnLst>
                               <p:par>
-                                <p:cTn id="35" presetID="1" presetClass="entr" presetSubtype="0" fill="hold" grpId="0" nodeType="clickEffect">
+                                <p:cTn id="33" presetID="1" presetClass="entr" presetSubtype="0" fill="hold" grpId="0" nodeType="withEffect">
+                                  <p:stCondLst>
+                                    <p:cond delay="0"/>
+                                  </p:stCondLst>
+                                  <p:childTnLst>
+                                    <p:set>
+                                      <p:cBhvr>
+                                        <p:cTn id="34" dur="1" fill="hold">
+                                          <p:stCondLst>
+                                            <p:cond delay="0"/>
+                                          </p:stCondLst>
+                                        </p:cTn>
+                                        <p:tgtEl>
+                                          <p:spTgt spid="3">
+                                            <p:txEl>
+                                              <p:pRg st="10" end="10"/>
+                                            </p:txEl>
+                                          </p:spTgt>
+                                        </p:tgtEl>
+                                        <p:attrNameLst>
+                                          <p:attrName>style.visibility</p:attrName>
+                                        </p:attrNameLst>
+                                      </p:cBhvr>
+                                      <p:to>
+                                        <p:strVal val="visible"/>
+                                      </p:to>
+                                    </p:set>
+                                  </p:childTnLst>
+                                </p:cTn>
+                              </p:par>
+                              <p:par>
+                                <p:cTn id="35" presetID="1" presetClass="entr" presetSubtype="0" fill="hold" grpId="0" nodeType="withEffect">
                                   <p:stCondLst>
                                     <p:cond delay="0"/>
                                   </p:stCondLst>
@@ -5643,55 +5661,6 @@
                                           <p:spTgt spid="3">
                                             <p:txEl>
                                               <p:pRg st="13" end="13"/>
-                                            </p:txEl>
-                                          </p:spTgt>
-                                        </p:tgtEl>
-                                        <p:attrNameLst>
-                                          <p:attrName>style.visibility</p:attrName>
-                                        </p:attrNameLst>
-                                      </p:cBhvr>
-                                      <p:to>
-                                        <p:strVal val="visible"/>
-                                      </p:to>
-                                    </p:set>
-                                  </p:childTnLst>
-                                </p:cTn>
-                              </p:par>
-                            </p:childTnLst>
-                          </p:cTn>
-                        </p:par>
-                      </p:childTnLst>
-                    </p:cTn>
-                  </p:par>
-                  <p:par>
-                    <p:cTn id="45" fill="hold">
-                      <p:stCondLst>
-                        <p:cond delay="indefinite"/>
-                      </p:stCondLst>
-                      <p:childTnLst>
-                        <p:par>
-                          <p:cTn id="46" fill="hold">
-                            <p:stCondLst>
-                              <p:cond delay="0"/>
-                            </p:stCondLst>
-                            <p:childTnLst>
-                              <p:par>
-                                <p:cTn id="47" presetID="1" presetClass="entr" presetSubtype="0" fill="hold" grpId="0" nodeType="clickEffect">
-                                  <p:stCondLst>
-                                    <p:cond delay="0"/>
-                                  </p:stCondLst>
-                                  <p:childTnLst>
-                                    <p:set>
-                                      <p:cBhvr>
-                                        <p:cTn id="48" dur="1" fill="hold">
-                                          <p:stCondLst>
-                                            <p:cond delay="0"/>
-                                          </p:stCondLst>
-                                        </p:cTn>
-                                        <p:tgtEl>
-                                          <p:spTgt spid="3">
-                                            <p:txEl>
-                                              <p:pRg st="14" end="14"/>
                                             </p:txEl>
                                           </p:spTgt>
                                         </p:tgtEl>
@@ -14393,7 +14362,7 @@
           <a:p>
             <a:r>
               <a:rPr lang="en-ZA" dirty="0"/>
-              <a:t>Threads switch even if they don’t need to</a:t>
+              <a:t>Reasonably light weight to spawn</a:t>
             </a:r>
           </a:p>
           <a:p>
@@ -14413,7 +14382,7 @@
             <a:pPr lvl="1"/>
             <a:r>
               <a:rPr lang="en-ZA" dirty="0"/>
-              <a:t>Code must be thread safe</a:t>
+              <a:t>Code must be thread safe (Thread safe data structures)</a:t>
             </a:r>
           </a:p>
           <a:p>

</xml_diff>